<commit_message>
fixing typos in the code examples
</commit_message>
<xml_diff>
--- a/murach_js_3e/slides/Chapter 07 slides.pptx
+++ b/murach_js_3e/slides/Chapter 07 slides.pptx
@@ -356,7 +356,7 @@
               <a:pPr>
                 <a:defRPr/>
               </a:pPr>
-              <a:t>2/16/2017</a:t>
+              <a:t>7/15/2020</a:t>
             </a:fld>
             <a:endParaRPr lang="en-US"/>
           </a:p>
@@ -718,35 +718,35 @@
           <a:p>
             <a:pPr lvl="0"/>
             <a:r>
-              <a:rPr lang="en-US" noProof="0" smtClean="0"/>
+              <a:rPr lang="en-US" noProof="0"/>
               <a:t>Click to edit Master text styles</a:t>
             </a:r>
           </a:p>
           <a:p>
             <a:pPr lvl="1"/>
             <a:r>
-              <a:rPr lang="en-US" noProof="0" smtClean="0"/>
+              <a:rPr lang="en-US" noProof="0"/>
               <a:t>Second level</a:t>
             </a:r>
           </a:p>
           <a:p>
             <a:pPr lvl="2"/>
             <a:r>
-              <a:rPr lang="en-US" noProof="0" smtClean="0"/>
+              <a:rPr lang="en-US" noProof="0"/>
               <a:t>Third level</a:t>
             </a:r>
           </a:p>
           <a:p>
             <a:pPr lvl="3"/>
             <a:r>
-              <a:rPr lang="en-US" noProof="0" smtClean="0"/>
+              <a:rPr lang="en-US" noProof="0"/>
               <a:t>Fourth level</a:t>
             </a:r>
           </a:p>
           <a:p>
             <a:pPr lvl="4"/>
             <a:r>
-              <a:rPr lang="en-US" noProof="0" smtClean="0"/>
+              <a:rPr lang="en-US" noProof="0"/>
               <a:t>Fifth level</a:t>
             </a:r>
           </a:p>
@@ -1036,10 +1036,9 @@
           </a:lstStyle>
           <a:p>
             <a:r>
-              <a:rPr lang="en-US" dirty="0" smtClean="0"/>
+              <a:rPr lang="en-US" dirty="0"/>
               <a:t>Chapter number</a:t>
             </a:r>
-            <a:endParaRPr lang="en-US" dirty="0"/>
           </a:p>
         </p:txBody>
       </p:sp>
@@ -1066,7 +1065,7 @@
               <a:defRPr/>
             </a:pPr>
             <a:r>
-              <a:rPr lang="en-US" smtClean="0"/>
+              <a:rPr lang="en-US"/>
               <a:t>Murach's JavaScript and jQuery (3rd Ed.)</a:t>
             </a:r>
             <a:endParaRPr lang="en-US" dirty="0"/>
@@ -1092,10 +1091,9 @@
               <a:defRPr/>
             </a:pPr>
             <a:r>
-              <a:rPr lang="en-US" smtClean="0"/>
+              <a:rPr lang="en-US"/>
               <a:t>© 2017, Mike Murach &amp; Associates, Inc.</a:t>
             </a:r>
-            <a:endParaRPr lang="en-US"/>
           </a:p>
         </p:txBody>
       </p:sp>
@@ -1117,7 +1115,7 @@
             <a:pPr algn="l">
               <a:defRPr/>
             </a:pPr>
-            <a:endParaRPr lang="en-US" sz="1400" dirty="0" smtClean="0">
+            <a:endParaRPr lang="en-US" sz="1400" dirty="0">
               <a:latin typeface="Times New Roman"/>
             </a:endParaRPr>
           </a:p>
@@ -1126,7 +1124,7 @@
               <a:defRPr/>
             </a:pPr>
             <a:r>
-              <a:rPr lang="en-US" dirty="0" smtClean="0">
+              <a:rPr lang="en-US" dirty="0">
                 <a:solidFill>
                   <a:schemeClr val="bg1"/>
                 </a:solidFill>
@@ -1240,10 +1238,10 @@
           <a:p>
             <a:pPr lvl="0"/>
             <a:r>
-              <a:rPr lang="en-US" smtClean="0"/>
+              <a:rPr lang="en-US"/>
               <a:t>Click to edit Master title style</a:t>
             </a:r>
-            <a:endParaRPr lang="en-US" dirty="0" smtClean="0"/>
+            <a:endParaRPr lang="en-US" dirty="0"/>
           </a:p>
         </p:txBody>
       </p:sp>
@@ -1272,7 +1270,7 @@
               <a:defRPr/>
             </a:pPr>
             <a:r>
-              <a:rPr lang="en-US" smtClean="0"/>
+              <a:rPr lang="en-US"/>
               <a:t>Murach's JavaScript and jQuery (3rd Ed.)</a:t>
             </a:r>
             <a:endParaRPr lang="en-US" dirty="0"/>
@@ -1304,10 +1302,9 @@
               <a:defRPr/>
             </a:pPr>
             <a:r>
-              <a:rPr lang="en-US" smtClean="0"/>
+              <a:rPr lang="en-US"/>
               <a:t>© 2017, Mike Murach &amp; Associates, Inc.</a:t>
             </a:r>
-            <a:endParaRPr lang="en-US"/>
           </a:p>
         </p:txBody>
       </p:sp>
@@ -1337,14 +1334,14 @@
             <a:pPr>
               <a:defRPr/>
             </a:pPr>
-            <a:endParaRPr lang="en-US" dirty="0" smtClean="0"/>
+            <a:endParaRPr lang="en-US" dirty="0"/>
           </a:p>
           <a:p>
             <a:pPr algn="r">
               <a:defRPr/>
             </a:pPr>
             <a:r>
-              <a:rPr lang="en-US" sz="900" dirty="0" smtClean="0">
+              <a:rPr lang="en-US" sz="900" dirty="0">
                 <a:solidFill>
                   <a:schemeClr val="bg1"/>
                 </a:solidFill>
@@ -1434,67 +1431,65 @@
           </a:lstStyle>
           <a:p>
             <a:r>
-              <a:rPr lang="en-US" dirty="0" smtClean="0"/>
+              <a:rPr lang="en-US" dirty="0"/>
               <a:t>Chapter number</a:t>
             </a:r>
+          </a:p>
+        </p:txBody>
+      </p:sp>
+      <p:sp>
+        <p:nvSpPr>
+          <p:cNvPr id="3" name="Date Placeholder 2"/>
+          <p:cNvSpPr>
+            <a:spLocks noGrp="1"/>
+          </p:cNvSpPr>
+          <p:nvPr>
+            <p:ph type="dt" sz="half" idx="10"/>
+          </p:nvPr>
+        </p:nvSpPr>
+        <p:spPr/>
+        <p:txBody>
+          <a:bodyPr/>
+          <a:lstStyle/>
+          <a:p>
+            <a:pPr>
+              <a:defRPr/>
+            </a:pPr>
+            <a:r>
+              <a:rPr lang="en-US"/>
+              <a:t>Murach's JavaScript and jQuery (3rd Ed.)</a:t>
+            </a:r>
+          </a:p>
+        </p:txBody>
+      </p:sp>
+      <p:sp>
+        <p:nvSpPr>
+          <p:cNvPr id="4" name="Footer Placeholder 3"/>
+          <p:cNvSpPr>
+            <a:spLocks noGrp="1"/>
+          </p:cNvSpPr>
+          <p:nvPr>
+            <p:ph type="ftr" sz="quarter" idx="11"/>
+          </p:nvPr>
+        </p:nvSpPr>
+        <p:spPr/>
+        <p:txBody>
+          <a:bodyPr/>
+          <a:lstStyle/>
+          <a:p>
+            <a:pPr>
+              <a:defRPr/>
+            </a:pPr>
+            <a:r>
+              <a:rPr lang="en-US"/>
+              <a:t>© 2017, Mike Murach &amp; Associates, Inc.</a:t>
+            </a:r>
             <a:endParaRPr lang="en-US" dirty="0"/>
           </a:p>
         </p:txBody>
       </p:sp>
       <p:sp>
         <p:nvSpPr>
-          <p:cNvPr id="3" name="Date Placeholder 2"/>
-          <p:cNvSpPr>
-            <a:spLocks noGrp="1"/>
-          </p:cNvSpPr>
-          <p:nvPr>
-            <p:ph type="dt" sz="half" idx="10"/>
-          </p:nvPr>
-        </p:nvSpPr>
-        <p:spPr/>
-        <p:txBody>
-          <a:bodyPr/>
-          <a:lstStyle/>
-          <a:p>
-            <a:pPr>
-              <a:defRPr/>
-            </a:pPr>
-            <a:r>
-              <a:rPr lang="en-US" smtClean="0"/>
-              <a:t>Murach's JavaScript and jQuery (3rd Ed.)</a:t>
-            </a:r>
-            <a:endParaRPr lang="en-US"/>
-          </a:p>
-        </p:txBody>
-      </p:sp>
-      <p:sp>
-        <p:nvSpPr>
-          <p:cNvPr id="4" name="Footer Placeholder 3"/>
-          <p:cNvSpPr>
-            <a:spLocks noGrp="1"/>
-          </p:cNvSpPr>
-          <p:nvPr>
-            <p:ph type="ftr" sz="quarter" idx="11"/>
-          </p:nvPr>
-        </p:nvSpPr>
-        <p:spPr/>
-        <p:txBody>
-          <a:bodyPr/>
-          <a:lstStyle/>
-          <a:p>
-            <a:pPr>
-              <a:defRPr/>
-            </a:pPr>
-            <a:r>
-              <a:rPr lang="en-US" smtClean="0"/>
-              <a:t>© 2017, Mike Murach &amp; Associates, Inc.</a:t>
-            </a:r>
-            <a:endParaRPr lang="en-US" dirty="0"/>
-          </a:p>
-        </p:txBody>
-      </p:sp>
-      <p:sp>
-        <p:nvSpPr>
           <p:cNvPr id="5" name="Slide Number Placeholder 4"/>
           <p:cNvSpPr>
             <a:spLocks noGrp="1"/>
@@ -1511,7 +1506,7 @@
             <a:pPr algn="l">
               <a:defRPr/>
             </a:pPr>
-            <a:endParaRPr lang="en-US" sz="1400" smtClean="0">
+            <a:endParaRPr lang="en-US" sz="1400">
               <a:latin typeface="Times New Roman"/>
             </a:endParaRPr>
           </a:p>
@@ -1520,7 +1515,7 @@
               <a:defRPr/>
             </a:pPr>
             <a:r>
-              <a:rPr lang="en-US" smtClean="0"/>
+              <a:rPr lang="en-US"/>
               <a:t>Slide </a:t>
             </a:r>
             <a:fld id="{BF5C1183-B085-4070-A402-C03A3F977D3D}" type="slidenum">
@@ -1622,7 +1617,7 @@
           <a:p>
             <a:pPr lvl="0"/>
             <a:r>
-              <a:rPr lang="en-US" dirty="0" smtClean="0"/>
+              <a:rPr lang="en-US" dirty="0"/>
               <a:t>Click to edit Master title style</a:t>
             </a:r>
           </a:p>
@@ -1653,10 +1648,9 @@
               <a:defRPr/>
             </a:pPr>
             <a:r>
-              <a:rPr lang="en-US" smtClean="0"/>
+              <a:rPr lang="en-US"/>
               <a:t>Murach's JavaScript and jQuery (3rd Ed.)</a:t>
             </a:r>
-            <a:endParaRPr lang="en-US"/>
           </a:p>
         </p:txBody>
       </p:sp>
@@ -1685,10 +1679,9 @@
               <a:defRPr/>
             </a:pPr>
             <a:r>
-              <a:rPr lang="en-US" smtClean="0"/>
+              <a:rPr lang="en-US"/>
               <a:t>© 2017, Mike Murach &amp; Associates, Inc.</a:t>
             </a:r>
-            <a:endParaRPr lang="en-US"/>
           </a:p>
         </p:txBody>
       </p:sp>
@@ -1833,7 +1826,7 @@
               <a:buNone/>
               <a:tabLst/>
             </a:pPr>
-            <a:endParaRPr kumimoji="0" lang="en-US" sz="2400" b="0" i="0" u="none" strike="noStrike" cap="none" normalizeH="0" baseline="0" smtClean="0">
+            <a:endParaRPr kumimoji="0" lang="en-US" sz="2400" b="0" i="0" u="none" strike="noStrike" cap="none" normalizeH="0" baseline="0">
               <a:ln>
                 <a:noFill/>
               </a:ln>
@@ -1898,7 +1891,7 @@
           <a:p>
             <a:pPr lvl="0"/>
             <a:r>
-              <a:rPr lang="en-US" smtClean="0"/>
+              <a:rPr lang="en-US"/>
               <a:t>Click to edit Master title style</a:t>
             </a:r>
           </a:p>
@@ -1956,35 +1949,35 @@
           <a:p>
             <a:pPr lvl="0"/>
             <a:r>
-              <a:rPr lang="en-US" smtClean="0"/>
+              <a:rPr lang="en-US"/>
               <a:t>Click to edit Master text styles</a:t>
             </a:r>
           </a:p>
           <a:p>
             <a:pPr lvl="1"/>
             <a:r>
-              <a:rPr lang="en-US" smtClean="0"/>
+              <a:rPr lang="en-US"/>
               <a:t>Second level</a:t>
             </a:r>
           </a:p>
           <a:p>
             <a:pPr lvl="2"/>
             <a:r>
-              <a:rPr lang="en-US" smtClean="0"/>
+              <a:rPr lang="en-US"/>
               <a:t>Third level</a:t>
             </a:r>
           </a:p>
           <a:p>
             <a:pPr lvl="3"/>
             <a:r>
-              <a:rPr lang="en-US" smtClean="0"/>
+              <a:rPr lang="en-US"/>
               <a:t>Fourth level</a:t>
             </a:r>
           </a:p>
           <a:p>
             <a:pPr lvl="4"/>
             <a:r>
-              <a:rPr lang="en-US" smtClean="0"/>
+              <a:rPr lang="en-US"/>
               <a:t>Fifth level</a:t>
             </a:r>
           </a:p>
@@ -2037,7 +2030,7 @@
               <a:defRPr/>
             </a:pPr>
             <a:r>
-              <a:rPr lang="en-US" smtClean="0"/>
+              <a:rPr lang="en-US"/>
               <a:t>Murach's JavaScript and jQuery (3rd Ed.)</a:t>
             </a:r>
             <a:endParaRPr lang="en-US" dirty="0"/>
@@ -2090,10 +2083,9 @@
               <a:defRPr/>
             </a:pPr>
             <a:r>
-              <a:rPr lang="en-US" smtClean="0"/>
+              <a:rPr lang="en-US"/>
               <a:t>© 2017, Mike Murach &amp; Associates, Inc.</a:t>
             </a:r>
-            <a:endParaRPr lang="en-US"/>
           </a:p>
         </p:txBody>
       </p:sp>
@@ -2139,7 +2131,7 @@
             <a:pPr algn="l">
               <a:defRPr/>
             </a:pPr>
-            <a:endParaRPr lang="en-US" sz="1400" dirty="0" smtClean="0">
+            <a:endParaRPr lang="en-US" sz="1400" dirty="0">
               <a:latin typeface="Times New Roman"/>
             </a:endParaRPr>
           </a:p>
@@ -2148,7 +2140,7 @@
               <a:defRPr/>
             </a:pPr>
             <a:r>
-              <a:rPr lang="en-US" dirty="0" smtClean="0">
+              <a:rPr lang="en-US" dirty="0">
                 <a:solidFill>
                   <a:schemeClr val="bg1"/>
                 </a:solidFill>
@@ -2616,10 +2608,9 @@
           <a:lstStyle/>
           <a:p>
             <a:r>
-              <a:rPr lang="en-US" dirty="0" smtClean="0"/>
+              <a:rPr lang="en-US" dirty="0"/>
               <a:t>Chapter 7</a:t>
             </a:r>
-            <a:endParaRPr lang="en-US" dirty="0"/>
           </a:p>
         </p:txBody>
       </p:sp>
@@ -2645,12 +2636,12 @@
           <a:graphicData uri="http://schemas.openxmlformats.org/presentationml/2006/ole">
             <mc:AlternateContent xmlns:mc="http://schemas.openxmlformats.org/markup-compatibility/2006">
               <mc:Choice xmlns:v="urn:schemas-microsoft-com:vml" Requires="v">
-                <p:oleObj spid="_x0000_s1035" name="Document" r:id="rId4" imgW="7313400" imgH="1782008" progId="Word.Document.12">
+                <p:oleObj spid="_x0000_s1039" name="Document" r:id="rId3" imgW="7313400" imgH="1782008" progId="Word.Document.12">
                   <p:embed/>
                 </p:oleObj>
               </mc:Choice>
               <mc:Fallback>
-                <p:oleObj name="Document" r:id="rId4" imgW="7313400" imgH="1782008" progId="Word.Document.12">
+                <p:oleObj name="Document" r:id="rId3" imgW="7313400" imgH="1782008" progId="Word.Document.12">
                   <p:embed/>
                   <p:pic>
                     <p:nvPicPr>
@@ -2659,7 +2650,7 @@
                       <p:nvPr/>
                     </p:nvPicPr>
                     <p:blipFill>
-                      <a:blip r:embed="rId5"/>
+                      <a:blip r:embed="rId4"/>
                       <a:stretch>
                         <a:fillRect/>
                       </a:stretch>
@@ -2699,7 +2690,7 @@
               <a:defRPr/>
             </a:pPr>
             <a:r>
-              <a:rPr lang="en-US" smtClean="0"/>
+              <a:rPr lang="en-US"/>
               <a:t>Murach's JavaScript and jQuery (3rd Ed.)</a:t>
             </a:r>
             <a:endParaRPr lang="en-US" dirty="0"/>
@@ -2725,10 +2716,9 @@
               <a:defRPr/>
             </a:pPr>
             <a:r>
-              <a:rPr lang="en-US" smtClean="0"/>
+              <a:rPr lang="en-US"/>
               <a:t>© 2017, Mike Murach &amp; Associates, Inc.</a:t>
             </a:r>
-            <a:endParaRPr lang="en-US"/>
           </a:p>
         </p:txBody>
       </p:sp>
@@ -2750,7 +2740,7 @@
             <a:pPr algn="l">
               <a:defRPr/>
             </a:pPr>
-            <a:endParaRPr lang="en-US" sz="1400" smtClean="0">
+            <a:endParaRPr lang="en-US" sz="1400">
               <a:latin typeface="Times New Roman"/>
             </a:endParaRPr>
           </a:p>
@@ -2759,7 +2749,7 @@
               <a:defRPr/>
             </a:pPr>
             <a:r>
-              <a:rPr lang="en-US" smtClean="0">
+              <a:rPr lang="en-US">
                 <a:solidFill>
                   <a:schemeClr val="bg1"/>
                 </a:solidFill>
@@ -2795,13 +2785,6 @@
   <p:clrMapOvr>
     <a:masterClrMapping/>
   </p:clrMapOvr>
-  <p:timing>
-    <p:tnLst>
-      <p:par>
-        <p:cTn id="1" dur="indefinite" restart="never" nodeType="tmRoot"/>
-      </p:par>
-    </p:tnLst>
-  </p:timing>
 </p:sld>
 </file>
 
@@ -2871,12 +2854,12 @@
           <a:graphicData uri="http://schemas.openxmlformats.org/presentationml/2006/ole">
             <mc:AlternateContent xmlns:mc="http://schemas.openxmlformats.org/markup-compatibility/2006">
               <mc:Choice xmlns:v="urn:schemas-microsoft-com:vml" Requires="v">
-                <p:oleObj spid="_x0000_s23563" name="Document" r:id="rId4" imgW="7313400" imgH="4148664" progId="Word.Document.12">
+                <p:oleObj spid="_x0000_s23567" name="Document" r:id="rId3" imgW="7313400" imgH="4148664" progId="Word.Document.12">
                   <p:embed/>
                 </p:oleObj>
               </mc:Choice>
               <mc:Fallback>
-                <p:oleObj name="Document" r:id="rId4" imgW="7313400" imgH="4148664" progId="Word.Document.12">
+                <p:oleObj name="Document" r:id="rId3" imgW="7313400" imgH="4148664" progId="Word.Document.12">
                   <p:embed/>
                   <p:pic>
                     <p:nvPicPr>
@@ -2885,7 +2868,7 @@
                       <p:nvPr/>
                     </p:nvPicPr>
                     <p:blipFill>
-                      <a:blip r:embed="rId5"/>
+                      <a:blip r:embed="rId4"/>
                       <a:stretch>
                         <a:fillRect/>
                       </a:stretch>
@@ -2925,7 +2908,7 @@
               <a:defRPr/>
             </a:pPr>
             <a:r>
-              <a:rPr lang="en-US" smtClean="0"/>
+              <a:rPr lang="en-US"/>
               <a:t>Murach's JavaScript and jQuery (3rd Ed.)</a:t>
             </a:r>
             <a:endParaRPr lang="en-US" dirty="0"/>
@@ -2951,39 +2934,38 @@
               <a:defRPr/>
             </a:pPr>
             <a:r>
-              <a:rPr lang="en-US" smtClean="0"/>
+              <a:rPr lang="en-US"/>
               <a:t>© 2017, Mike Murach &amp; Associates, Inc.</a:t>
             </a:r>
+          </a:p>
+        </p:txBody>
+      </p:sp>
+      <p:sp>
+        <p:nvSpPr>
+          <p:cNvPr id="9" name="Slide Number Placeholder 8"/>
+          <p:cNvSpPr>
+            <a:spLocks noGrp="1"/>
+          </p:cNvSpPr>
+          <p:nvPr>
+            <p:ph type="sldNum" sz="quarter" idx="12"/>
+          </p:nvPr>
+        </p:nvSpPr>
+        <p:spPr/>
+        <p:txBody>
+          <a:bodyPr/>
+          <a:lstStyle/>
+          <a:p>
+            <a:pPr>
+              <a:defRPr/>
+            </a:pPr>
             <a:endParaRPr lang="en-US"/>
           </a:p>
-        </p:txBody>
-      </p:sp>
-      <p:sp>
-        <p:nvSpPr>
-          <p:cNvPr id="9" name="Slide Number Placeholder 8"/>
-          <p:cNvSpPr>
-            <a:spLocks noGrp="1"/>
-          </p:cNvSpPr>
-          <p:nvPr>
-            <p:ph type="sldNum" sz="quarter" idx="12"/>
-          </p:nvPr>
-        </p:nvSpPr>
-        <p:spPr/>
-        <p:txBody>
-          <a:bodyPr/>
-          <a:lstStyle/>
-          <a:p>
-            <a:pPr>
-              <a:defRPr/>
-            </a:pPr>
-            <a:endParaRPr lang="en-US" smtClean="0"/>
-          </a:p>
           <a:p>
             <a:pPr algn="r">
               <a:defRPr/>
             </a:pPr>
             <a:r>
-              <a:rPr lang="en-US" sz="900" smtClean="0">
+              <a:rPr lang="en-US" sz="900">
                 <a:solidFill>
                   <a:schemeClr val="bg1"/>
                 </a:solidFill>
@@ -3022,13 +3004,6 @@
   <p:clrMapOvr>
     <a:masterClrMapping/>
   </p:clrMapOvr>
-  <p:timing>
-    <p:tnLst>
-      <p:par>
-        <p:cTn id="1" dur="indefinite" restart="never" nodeType="tmRoot"/>
-      </p:par>
-    </p:tnLst>
-  </p:timing>
 </p:sld>
 </file>
 
@@ -3098,12 +3073,12 @@
           <a:graphicData uri="http://schemas.openxmlformats.org/presentationml/2006/ole">
             <mc:AlternateContent xmlns:mc="http://schemas.openxmlformats.org/markup-compatibility/2006">
               <mc:Choice xmlns:v="urn:schemas-microsoft-com:vml" Requires="v">
-                <p:oleObj spid="_x0000_s24587" name="Document" r:id="rId4" imgW="7313400" imgH="4061236" progId="Word.Document.12">
+                <p:oleObj spid="_x0000_s24591" name="Document" r:id="rId3" imgW="7313400" imgH="4061236" progId="Word.Document.12">
                   <p:embed/>
                 </p:oleObj>
               </mc:Choice>
               <mc:Fallback>
-                <p:oleObj name="Document" r:id="rId4" imgW="7313400" imgH="4061236" progId="Word.Document.12">
+                <p:oleObj name="Document" r:id="rId3" imgW="7313400" imgH="4061236" progId="Word.Document.12">
                   <p:embed/>
                   <p:pic>
                     <p:nvPicPr>
@@ -3112,7 +3087,7 @@
                       <p:nvPr/>
                     </p:nvPicPr>
                     <p:blipFill>
-                      <a:blip r:embed="rId5"/>
+                      <a:blip r:embed="rId4"/>
                       <a:stretch>
                         <a:fillRect/>
                       </a:stretch>
@@ -3152,7 +3127,7 @@
               <a:defRPr/>
             </a:pPr>
             <a:r>
-              <a:rPr lang="en-US" smtClean="0"/>
+              <a:rPr lang="en-US"/>
               <a:t>Murach's JavaScript and jQuery (3rd Ed.)</a:t>
             </a:r>
             <a:endParaRPr lang="en-US" dirty="0"/>
@@ -3178,39 +3153,38 @@
               <a:defRPr/>
             </a:pPr>
             <a:r>
-              <a:rPr lang="en-US" smtClean="0"/>
+              <a:rPr lang="en-US"/>
               <a:t>© 2017, Mike Murach &amp; Associates, Inc.</a:t>
             </a:r>
+          </a:p>
+        </p:txBody>
+      </p:sp>
+      <p:sp>
+        <p:nvSpPr>
+          <p:cNvPr id="9" name="Slide Number Placeholder 8"/>
+          <p:cNvSpPr>
+            <a:spLocks noGrp="1"/>
+          </p:cNvSpPr>
+          <p:nvPr>
+            <p:ph type="sldNum" sz="quarter" idx="12"/>
+          </p:nvPr>
+        </p:nvSpPr>
+        <p:spPr/>
+        <p:txBody>
+          <a:bodyPr/>
+          <a:lstStyle/>
+          <a:p>
+            <a:pPr>
+              <a:defRPr/>
+            </a:pPr>
             <a:endParaRPr lang="en-US"/>
           </a:p>
-        </p:txBody>
-      </p:sp>
-      <p:sp>
-        <p:nvSpPr>
-          <p:cNvPr id="9" name="Slide Number Placeholder 8"/>
-          <p:cNvSpPr>
-            <a:spLocks noGrp="1"/>
-          </p:cNvSpPr>
-          <p:nvPr>
-            <p:ph type="sldNum" sz="quarter" idx="12"/>
-          </p:nvPr>
-        </p:nvSpPr>
-        <p:spPr/>
-        <p:txBody>
-          <a:bodyPr/>
-          <a:lstStyle/>
-          <a:p>
-            <a:pPr>
-              <a:defRPr/>
-            </a:pPr>
-            <a:endParaRPr lang="en-US" smtClean="0"/>
-          </a:p>
           <a:p>
             <a:pPr algn="r">
               <a:defRPr/>
             </a:pPr>
             <a:r>
-              <a:rPr lang="en-US" sz="900" smtClean="0">
+              <a:rPr lang="en-US" sz="900">
                 <a:solidFill>
                   <a:schemeClr val="bg1"/>
                 </a:solidFill>
@@ -3249,13 +3223,6 @@
   <p:clrMapOvr>
     <a:masterClrMapping/>
   </p:clrMapOvr>
-  <p:timing>
-    <p:tnLst>
-      <p:par>
-        <p:cTn id="1" dur="indefinite" restart="never" nodeType="tmRoot"/>
-      </p:par>
-    </p:tnLst>
-  </p:timing>
 </p:sld>
 </file>
 
@@ -3314,25 +3281,25 @@
           <p:nvPr>
             <p:extLst>
               <p:ext uri="{D42A27DB-BD31-4B8C-83A1-F6EECF244321}">
-                <p14:modId xmlns:p14="http://schemas.microsoft.com/office/powerpoint/2010/main" val="3606458040"/>
+                <p14:modId xmlns:p14="http://schemas.microsoft.com/office/powerpoint/2010/main" val="372506526"/>
               </p:ext>
             </p:extLst>
           </p:nvPr>
         </p:nvGraphicFramePr>
         <p:xfrm>
-          <a:off x="914400" y="1295400"/>
-          <a:ext cx="7300912" cy="466725"/>
+          <a:off x="914400" y="1293813"/>
+          <a:ext cx="7253288" cy="463550"/>
         </p:xfrm>
         <a:graphic>
           <a:graphicData uri="http://schemas.openxmlformats.org/presentationml/2006/ole">
             <mc:AlternateContent xmlns:mc="http://schemas.openxmlformats.org/markup-compatibility/2006">
               <mc:Choice xmlns:v="urn:schemas-microsoft-com:vml" Requires="v">
-                <p:oleObj spid="_x0000_s25611" name="Document" r:id="rId4" imgW="7301323" imgH="466645" progId="Word.Document.12">
+                <p:oleObj spid="_x0000_s25615" name="Document" r:id="rId3" imgW="7301323" imgH="467229" progId="Word.Document.12">
                   <p:embed/>
                 </p:oleObj>
               </mc:Choice>
               <mc:Fallback>
-                <p:oleObj name="Document" r:id="rId4" imgW="7301323" imgH="466645" progId="Word.Document.12">
+                <p:oleObj name="Document" r:id="rId3" imgW="7301323" imgH="467229" progId="Word.Document.12">
                   <p:embed/>
                   <p:pic>
                     <p:nvPicPr>
@@ -3341,15 +3308,15 @@
                       <p:nvPr/>
                     </p:nvPicPr>
                     <p:blipFill>
-                      <a:blip r:embed="rId5"/>
+                      <a:blip r:embed="rId4"/>
                       <a:stretch>
                         <a:fillRect/>
                       </a:stretch>
                     </p:blipFill>
                     <p:spPr>
                       <a:xfrm>
-                        <a:off x="914400" y="1295400"/>
-                        <a:ext cx="7300912" cy="466725"/>
+                        <a:off x="914400" y="1293813"/>
+                        <a:ext cx="7253288" cy="463550"/>
                       </a:xfrm>
                       <a:prstGeom prst="rect">
                         <a:avLst/>
@@ -3381,7 +3348,7 @@
               <a:defRPr/>
             </a:pPr>
             <a:r>
-              <a:rPr lang="en-US" smtClean="0"/>
+              <a:rPr lang="en-US"/>
               <a:t>Murach's JavaScript and jQuery (3rd Ed.)</a:t>
             </a:r>
             <a:endParaRPr lang="en-US" dirty="0"/>
@@ -3407,39 +3374,38 @@
               <a:defRPr/>
             </a:pPr>
             <a:r>
-              <a:rPr lang="en-US" smtClean="0"/>
+              <a:rPr lang="en-US"/>
               <a:t>© 2017, Mike Murach &amp; Associates, Inc.</a:t>
             </a:r>
+          </a:p>
+        </p:txBody>
+      </p:sp>
+      <p:sp>
+        <p:nvSpPr>
+          <p:cNvPr id="9" name="Slide Number Placeholder 8"/>
+          <p:cNvSpPr>
+            <a:spLocks noGrp="1"/>
+          </p:cNvSpPr>
+          <p:nvPr>
+            <p:ph type="sldNum" sz="quarter" idx="12"/>
+          </p:nvPr>
+        </p:nvSpPr>
+        <p:spPr/>
+        <p:txBody>
+          <a:bodyPr/>
+          <a:lstStyle/>
+          <a:p>
+            <a:pPr>
+              <a:defRPr/>
+            </a:pPr>
             <a:endParaRPr lang="en-US"/>
           </a:p>
-        </p:txBody>
-      </p:sp>
-      <p:sp>
-        <p:nvSpPr>
-          <p:cNvPr id="9" name="Slide Number Placeholder 8"/>
-          <p:cNvSpPr>
-            <a:spLocks noGrp="1"/>
-          </p:cNvSpPr>
-          <p:nvPr>
-            <p:ph type="sldNum" sz="quarter" idx="12"/>
-          </p:nvPr>
-        </p:nvSpPr>
-        <p:spPr/>
-        <p:txBody>
-          <a:bodyPr/>
-          <a:lstStyle/>
-          <a:p>
-            <a:pPr>
-              <a:defRPr/>
-            </a:pPr>
-            <a:endParaRPr lang="en-US" smtClean="0"/>
-          </a:p>
           <a:p>
             <a:pPr algn="r">
               <a:defRPr/>
             </a:pPr>
             <a:r>
-              <a:rPr lang="en-US" sz="900" smtClean="0">
+              <a:rPr lang="en-US" sz="900">
                 <a:solidFill>
                   <a:schemeClr val="bg1"/>
                 </a:solidFill>
@@ -3478,13 +3444,6 @@
   <p:clrMapOvr>
     <a:masterClrMapping/>
   </p:clrMapOvr>
-  <p:timing>
-    <p:tnLst>
-      <p:par>
-        <p:cTn id="1" dur="indefinite" restart="never" nodeType="tmRoot"/>
-      </p:par>
-    </p:tnLst>
-  </p:timing>
 </p:sld>
 </file>
 
@@ -3556,12 +3515,12 @@
           <a:graphicData uri="http://schemas.openxmlformats.org/presentationml/2006/ole">
             <mc:AlternateContent xmlns:mc="http://schemas.openxmlformats.org/markup-compatibility/2006">
               <mc:Choice xmlns:v="urn:schemas-microsoft-com:vml" Requires="v">
-                <p:oleObj spid="_x0000_s26635" name="Document" r:id="rId4" imgW="7313400" imgH="4480384" progId="Word.Document.12">
+                <p:oleObj spid="_x0000_s26639" name="Document" r:id="rId3" imgW="7313400" imgH="4480384" progId="Word.Document.12">
                   <p:embed/>
                 </p:oleObj>
               </mc:Choice>
               <mc:Fallback>
-                <p:oleObj name="Document" r:id="rId4" imgW="7313400" imgH="4480384" progId="Word.Document.12">
+                <p:oleObj name="Document" r:id="rId3" imgW="7313400" imgH="4480384" progId="Word.Document.12">
                   <p:embed/>
                   <p:pic>
                     <p:nvPicPr>
@@ -3570,7 +3529,7 @@
                       <p:nvPr/>
                     </p:nvPicPr>
                     <p:blipFill>
-                      <a:blip r:embed="rId5"/>
+                      <a:blip r:embed="rId4"/>
                       <a:stretch>
                         <a:fillRect/>
                       </a:stretch>
@@ -3610,7 +3569,7 @@
               <a:defRPr/>
             </a:pPr>
             <a:r>
-              <a:rPr lang="en-US" smtClean="0"/>
+              <a:rPr lang="en-US"/>
               <a:t>Murach's JavaScript and jQuery (3rd Ed.)</a:t>
             </a:r>
             <a:endParaRPr lang="en-US" dirty="0"/>
@@ -3636,39 +3595,38 @@
               <a:defRPr/>
             </a:pPr>
             <a:r>
-              <a:rPr lang="en-US" smtClean="0"/>
+              <a:rPr lang="en-US"/>
               <a:t>© 2017, Mike Murach &amp; Associates, Inc.</a:t>
             </a:r>
+          </a:p>
+        </p:txBody>
+      </p:sp>
+      <p:sp>
+        <p:nvSpPr>
+          <p:cNvPr id="11" name="Slide Number Placeholder 10"/>
+          <p:cNvSpPr>
+            <a:spLocks noGrp="1"/>
+          </p:cNvSpPr>
+          <p:nvPr>
+            <p:ph type="sldNum" sz="quarter" idx="12"/>
+          </p:nvPr>
+        </p:nvSpPr>
+        <p:spPr/>
+        <p:txBody>
+          <a:bodyPr/>
+          <a:lstStyle/>
+          <a:p>
+            <a:pPr>
+              <a:defRPr/>
+            </a:pPr>
             <a:endParaRPr lang="en-US"/>
           </a:p>
-        </p:txBody>
-      </p:sp>
-      <p:sp>
-        <p:nvSpPr>
-          <p:cNvPr id="11" name="Slide Number Placeholder 10"/>
-          <p:cNvSpPr>
-            <a:spLocks noGrp="1"/>
-          </p:cNvSpPr>
-          <p:nvPr>
-            <p:ph type="sldNum" sz="quarter" idx="12"/>
-          </p:nvPr>
-        </p:nvSpPr>
-        <p:spPr/>
-        <p:txBody>
-          <a:bodyPr/>
-          <a:lstStyle/>
-          <a:p>
-            <a:pPr>
-              <a:defRPr/>
-            </a:pPr>
-            <a:endParaRPr lang="en-US" smtClean="0"/>
-          </a:p>
           <a:p>
             <a:pPr algn="r">
               <a:defRPr/>
             </a:pPr>
             <a:r>
-              <a:rPr lang="en-US" sz="900" smtClean="0">
+              <a:rPr lang="en-US" sz="900">
                 <a:solidFill>
                   <a:schemeClr val="bg1"/>
                 </a:solidFill>
@@ -3707,13 +3665,6 @@
   <p:clrMapOvr>
     <a:masterClrMapping/>
   </p:clrMapOvr>
-  <p:timing>
-    <p:tnLst>
-      <p:par>
-        <p:cTn id="1" dur="indefinite" restart="never" nodeType="tmRoot"/>
-      </p:par>
-    </p:tnLst>
-  </p:timing>
 </p:sld>
 </file>
 
@@ -3790,12 +3741,12 @@
           <a:graphicData uri="http://schemas.openxmlformats.org/presentationml/2006/ole">
             <mc:AlternateContent xmlns:mc="http://schemas.openxmlformats.org/markup-compatibility/2006">
               <mc:Choice xmlns:v="urn:schemas-microsoft-com:vml" Requires="v">
-                <p:oleObj spid="_x0000_s27659" name="Document" r:id="rId4" imgW="7313400" imgH="4837649" progId="Word.Document.12">
+                <p:oleObj spid="_x0000_s27663" name="Document" r:id="rId3" imgW="7313400" imgH="4837649" progId="Word.Document.12">
                   <p:embed/>
                 </p:oleObj>
               </mc:Choice>
               <mc:Fallback>
-                <p:oleObj name="Document" r:id="rId4" imgW="7313400" imgH="4837649" progId="Word.Document.12">
+                <p:oleObj name="Document" r:id="rId3" imgW="7313400" imgH="4837649" progId="Word.Document.12">
                   <p:embed/>
                   <p:pic>
                     <p:nvPicPr>
@@ -3804,7 +3755,7 @@
                       <p:nvPr/>
                     </p:nvPicPr>
                     <p:blipFill>
-                      <a:blip r:embed="rId5"/>
+                      <a:blip r:embed="rId4"/>
                       <a:stretch>
                         <a:fillRect/>
                       </a:stretch>
@@ -3844,7 +3795,7 @@
               <a:defRPr/>
             </a:pPr>
             <a:r>
-              <a:rPr lang="en-US" smtClean="0"/>
+              <a:rPr lang="en-US"/>
               <a:t>Murach's JavaScript and jQuery (3rd Ed.)</a:t>
             </a:r>
             <a:endParaRPr lang="en-US" dirty="0"/>
@@ -3870,39 +3821,38 @@
               <a:defRPr/>
             </a:pPr>
             <a:r>
-              <a:rPr lang="en-US" smtClean="0"/>
+              <a:rPr lang="en-US"/>
               <a:t>© 2017, Mike Murach &amp; Associates, Inc.</a:t>
             </a:r>
+          </a:p>
+        </p:txBody>
+      </p:sp>
+      <p:sp>
+        <p:nvSpPr>
+          <p:cNvPr id="9" name="Slide Number Placeholder 8"/>
+          <p:cNvSpPr>
+            <a:spLocks noGrp="1"/>
+          </p:cNvSpPr>
+          <p:nvPr>
+            <p:ph type="sldNum" sz="quarter" idx="12"/>
+          </p:nvPr>
+        </p:nvSpPr>
+        <p:spPr/>
+        <p:txBody>
+          <a:bodyPr/>
+          <a:lstStyle/>
+          <a:p>
+            <a:pPr>
+              <a:defRPr/>
+            </a:pPr>
             <a:endParaRPr lang="en-US"/>
           </a:p>
-        </p:txBody>
-      </p:sp>
-      <p:sp>
-        <p:nvSpPr>
-          <p:cNvPr id="9" name="Slide Number Placeholder 8"/>
-          <p:cNvSpPr>
-            <a:spLocks noGrp="1"/>
-          </p:cNvSpPr>
-          <p:nvPr>
-            <p:ph type="sldNum" sz="quarter" idx="12"/>
-          </p:nvPr>
-        </p:nvSpPr>
-        <p:spPr/>
-        <p:txBody>
-          <a:bodyPr/>
-          <a:lstStyle/>
-          <a:p>
-            <a:pPr>
-              <a:defRPr/>
-            </a:pPr>
-            <a:endParaRPr lang="en-US" smtClean="0"/>
-          </a:p>
           <a:p>
             <a:pPr algn="r">
               <a:defRPr/>
             </a:pPr>
             <a:r>
-              <a:rPr lang="en-US" sz="900" smtClean="0">
+              <a:rPr lang="en-US" sz="900">
                 <a:solidFill>
                   <a:schemeClr val="bg1"/>
                 </a:solidFill>
@@ -3941,13 +3891,6 @@
   <p:clrMapOvr>
     <a:masterClrMapping/>
   </p:clrMapOvr>
-  <p:timing>
-    <p:tnLst>
-      <p:par>
-        <p:cTn id="1" dur="indefinite" restart="never" nodeType="tmRoot"/>
-      </p:par>
-    </p:tnLst>
-  </p:timing>
 </p:sld>
 </file>
 
@@ -4006,25 +3949,25 @@
           <p:nvPr>
             <p:extLst>
               <p:ext uri="{D42A27DB-BD31-4B8C-83A1-F6EECF244321}">
-                <p14:modId xmlns:p14="http://schemas.microsoft.com/office/powerpoint/2010/main" val="3612834276"/>
+                <p14:modId xmlns:p14="http://schemas.microsoft.com/office/powerpoint/2010/main" val="362125542"/>
               </p:ext>
             </p:extLst>
           </p:nvPr>
         </p:nvGraphicFramePr>
         <p:xfrm>
-          <a:off x="914400" y="1295400"/>
-          <a:ext cx="7300912" cy="466725"/>
+          <a:off x="914400" y="1293813"/>
+          <a:ext cx="7253288" cy="463550"/>
         </p:xfrm>
         <a:graphic>
           <a:graphicData uri="http://schemas.openxmlformats.org/presentationml/2006/ole">
             <mc:AlternateContent xmlns:mc="http://schemas.openxmlformats.org/markup-compatibility/2006">
               <mc:Choice xmlns:v="urn:schemas-microsoft-com:vml" Requires="v">
-                <p:oleObj spid="_x0000_s28682" name="Document" r:id="rId4" imgW="7301323" imgH="466645" progId="Word.Document.12">
+                <p:oleObj spid="_x0000_s28686" name="Document" r:id="rId3" imgW="7301323" imgH="467229" progId="Word.Document.12">
                   <p:embed/>
                 </p:oleObj>
               </mc:Choice>
               <mc:Fallback>
-                <p:oleObj name="Document" r:id="rId4" imgW="7301323" imgH="466645" progId="Word.Document.12">
+                <p:oleObj name="Document" r:id="rId3" imgW="7301323" imgH="467229" progId="Word.Document.12">
                   <p:embed/>
                   <p:pic>
                     <p:nvPicPr>
@@ -4033,15 +3976,15 @@
                       <p:nvPr/>
                     </p:nvPicPr>
                     <p:blipFill>
-                      <a:blip r:embed="rId5"/>
+                      <a:blip r:embed="rId4"/>
                       <a:stretch>
                         <a:fillRect/>
                       </a:stretch>
                     </p:blipFill>
                     <p:spPr>
                       <a:xfrm>
-                        <a:off x="914400" y="1295400"/>
-                        <a:ext cx="7300912" cy="466725"/>
+                        <a:off x="914400" y="1293813"/>
+                        <a:ext cx="7253288" cy="463550"/>
                       </a:xfrm>
                       <a:prstGeom prst="rect">
                         <a:avLst/>
@@ -4073,7 +4016,7 @@
               <a:defRPr/>
             </a:pPr>
             <a:r>
-              <a:rPr lang="en-US" smtClean="0"/>
+              <a:rPr lang="en-US"/>
               <a:t>Murach's JavaScript and jQuery (3rd Ed.)</a:t>
             </a:r>
             <a:endParaRPr lang="en-US" dirty="0"/>
@@ -4099,39 +4042,38 @@
               <a:defRPr/>
             </a:pPr>
             <a:r>
-              <a:rPr lang="en-US" smtClean="0"/>
+              <a:rPr lang="en-US"/>
               <a:t>© 2017, Mike Murach &amp; Associates, Inc.</a:t>
             </a:r>
+          </a:p>
+        </p:txBody>
+      </p:sp>
+      <p:sp>
+        <p:nvSpPr>
+          <p:cNvPr id="9" name="Slide Number Placeholder 8"/>
+          <p:cNvSpPr>
+            <a:spLocks noGrp="1"/>
+          </p:cNvSpPr>
+          <p:nvPr>
+            <p:ph type="sldNum" sz="quarter" idx="12"/>
+          </p:nvPr>
+        </p:nvSpPr>
+        <p:spPr/>
+        <p:txBody>
+          <a:bodyPr/>
+          <a:lstStyle/>
+          <a:p>
+            <a:pPr>
+              <a:defRPr/>
+            </a:pPr>
             <a:endParaRPr lang="en-US"/>
           </a:p>
-        </p:txBody>
-      </p:sp>
-      <p:sp>
-        <p:nvSpPr>
-          <p:cNvPr id="9" name="Slide Number Placeholder 8"/>
-          <p:cNvSpPr>
-            <a:spLocks noGrp="1"/>
-          </p:cNvSpPr>
-          <p:nvPr>
-            <p:ph type="sldNum" sz="quarter" idx="12"/>
-          </p:nvPr>
-        </p:nvSpPr>
-        <p:spPr/>
-        <p:txBody>
-          <a:bodyPr/>
-          <a:lstStyle/>
-          <a:p>
-            <a:pPr>
-              <a:defRPr/>
-            </a:pPr>
-            <a:endParaRPr lang="en-US" smtClean="0"/>
-          </a:p>
           <a:p>
             <a:pPr algn="r">
               <a:defRPr/>
             </a:pPr>
             <a:r>
-              <a:rPr lang="en-US" sz="900" smtClean="0">
+              <a:rPr lang="en-US" sz="900">
                 <a:solidFill>
                   <a:schemeClr val="bg1"/>
                 </a:solidFill>
@@ -4170,13 +4112,6 @@
   <p:clrMapOvr>
     <a:masterClrMapping/>
   </p:clrMapOvr>
-  <p:timing>
-    <p:tnLst>
-      <p:par>
-        <p:cTn id="1" dur="indefinite" restart="never" nodeType="tmRoot"/>
-      </p:par>
-    </p:tnLst>
-  </p:timing>
 </p:sld>
 </file>
 
@@ -4214,15 +4149,7 @@
           <a:p>
             <a:r>
               <a:rPr lang="en-US" dirty="0"/>
-              <a:t>The FAQs application with a counter </a:t>
-            </a:r>
-            <a:r>
-              <a:rPr lang="en-US" dirty="0" smtClean="0"/>
-              <a:t>at </a:t>
-            </a:r>
-            <a:r>
-              <a:rPr lang="en-US" dirty="0"/>
-              <a:t>the bottom</a:t>
+              <a:t>The FAQs application with a counter at the bottom</a:t>
             </a:r>
           </a:p>
         </p:txBody>
@@ -4249,12 +4176,12 @@
           <a:graphicData uri="http://schemas.openxmlformats.org/presentationml/2006/ole">
             <mc:AlternateContent xmlns:mc="http://schemas.openxmlformats.org/markup-compatibility/2006">
               <mc:Choice xmlns:v="urn:schemas-microsoft-com:vml" Requires="v">
-                <p:oleObj spid="_x0000_s29705" name="Document" r:id="rId4" imgW="7313400" imgH="3198835" progId="Word.Document.12">
+                <p:oleObj spid="_x0000_s29709" name="Document" r:id="rId3" imgW="7313400" imgH="3198835" progId="Word.Document.12">
                   <p:embed/>
                 </p:oleObj>
               </mc:Choice>
               <mc:Fallback>
-                <p:oleObj name="Document" r:id="rId4" imgW="7313400" imgH="3198835" progId="Word.Document.12">
+                <p:oleObj name="Document" r:id="rId3" imgW="7313400" imgH="3198835" progId="Word.Document.12">
                   <p:embed/>
                   <p:pic>
                     <p:nvPicPr>
@@ -4263,7 +4190,7 @@
                       <p:nvPr/>
                     </p:nvPicPr>
                     <p:blipFill>
-                      <a:blip r:embed="rId5"/>
+                      <a:blip r:embed="rId4"/>
                       <a:stretch>
                         <a:fillRect/>
                       </a:stretch>
@@ -4303,7 +4230,7 @@
               <a:defRPr/>
             </a:pPr>
             <a:r>
-              <a:rPr lang="en-US" smtClean="0"/>
+              <a:rPr lang="en-US"/>
               <a:t>Murach's JavaScript and jQuery (3rd Ed.)</a:t>
             </a:r>
             <a:endParaRPr lang="en-US" dirty="0"/>
@@ -4329,39 +4256,38 @@
               <a:defRPr/>
             </a:pPr>
             <a:r>
-              <a:rPr lang="en-US" smtClean="0"/>
+              <a:rPr lang="en-US"/>
               <a:t>© 2017, Mike Murach &amp; Associates, Inc.</a:t>
             </a:r>
+          </a:p>
+        </p:txBody>
+      </p:sp>
+      <p:sp>
+        <p:nvSpPr>
+          <p:cNvPr id="11" name="Slide Number Placeholder 10"/>
+          <p:cNvSpPr>
+            <a:spLocks noGrp="1"/>
+          </p:cNvSpPr>
+          <p:nvPr>
+            <p:ph type="sldNum" sz="quarter" idx="12"/>
+          </p:nvPr>
+        </p:nvSpPr>
+        <p:spPr/>
+        <p:txBody>
+          <a:bodyPr/>
+          <a:lstStyle/>
+          <a:p>
+            <a:pPr>
+              <a:defRPr/>
+            </a:pPr>
             <a:endParaRPr lang="en-US"/>
           </a:p>
-        </p:txBody>
-      </p:sp>
-      <p:sp>
-        <p:nvSpPr>
-          <p:cNvPr id="11" name="Slide Number Placeholder 10"/>
-          <p:cNvSpPr>
-            <a:spLocks noGrp="1"/>
-          </p:cNvSpPr>
-          <p:nvPr>
-            <p:ph type="sldNum" sz="quarter" idx="12"/>
-          </p:nvPr>
-        </p:nvSpPr>
-        <p:spPr/>
-        <p:txBody>
-          <a:bodyPr/>
-          <a:lstStyle/>
-          <a:p>
-            <a:pPr>
-              <a:defRPr/>
-            </a:pPr>
-            <a:endParaRPr lang="en-US" smtClean="0"/>
-          </a:p>
           <a:p>
             <a:pPr algn="r">
               <a:defRPr/>
             </a:pPr>
             <a:r>
-              <a:rPr lang="en-US" sz="900" smtClean="0">
+              <a:rPr lang="en-US" sz="900">
                 <a:solidFill>
                   <a:schemeClr val="bg1"/>
                 </a:solidFill>
@@ -4400,13 +4326,6 @@
   <p:clrMapOvr>
     <a:masterClrMapping/>
   </p:clrMapOvr>
-  <p:timing>
-    <p:tnLst>
-      <p:par>
-        <p:cTn id="1" dur="indefinite" restart="never" nodeType="tmRoot"/>
-      </p:par>
-    </p:tnLst>
-  </p:timing>
 </p:sld>
 </file>
 
@@ -4483,7 +4402,7 @@
               <a:defRPr/>
             </a:pPr>
             <a:r>
-              <a:rPr lang="en-US" smtClean="0"/>
+              <a:rPr lang="en-US"/>
               <a:t>Murach's JavaScript and jQuery (3rd Ed.)</a:t>
             </a:r>
             <a:endParaRPr lang="en-US" dirty="0"/>
@@ -4509,39 +4428,38 @@
               <a:defRPr/>
             </a:pPr>
             <a:r>
-              <a:rPr lang="en-US" smtClean="0"/>
+              <a:rPr lang="en-US"/>
               <a:t>© 2017, Mike Murach &amp; Associates, Inc.</a:t>
             </a:r>
+          </a:p>
+        </p:txBody>
+      </p:sp>
+      <p:sp>
+        <p:nvSpPr>
+          <p:cNvPr id="9" name="Slide Number Placeholder 8"/>
+          <p:cNvSpPr>
+            <a:spLocks noGrp="1"/>
+          </p:cNvSpPr>
+          <p:nvPr>
+            <p:ph type="sldNum" sz="quarter" idx="12"/>
+          </p:nvPr>
+        </p:nvSpPr>
+        <p:spPr/>
+        <p:txBody>
+          <a:bodyPr/>
+          <a:lstStyle/>
+          <a:p>
+            <a:pPr>
+              <a:defRPr/>
+            </a:pPr>
             <a:endParaRPr lang="en-US"/>
           </a:p>
-        </p:txBody>
-      </p:sp>
-      <p:sp>
-        <p:nvSpPr>
-          <p:cNvPr id="9" name="Slide Number Placeholder 8"/>
-          <p:cNvSpPr>
-            <a:spLocks noGrp="1"/>
-          </p:cNvSpPr>
-          <p:nvPr>
-            <p:ph type="sldNum" sz="quarter" idx="12"/>
-          </p:nvPr>
-        </p:nvSpPr>
-        <p:spPr/>
-        <p:txBody>
-          <a:bodyPr/>
-          <a:lstStyle/>
-          <a:p>
-            <a:pPr>
-              <a:defRPr/>
-            </a:pPr>
-            <a:endParaRPr lang="en-US" smtClean="0"/>
-          </a:p>
           <a:p>
             <a:pPr algn="r">
               <a:defRPr/>
             </a:pPr>
             <a:r>
-              <a:rPr lang="en-US" sz="900" smtClean="0">
+              <a:rPr lang="en-US" sz="900">
                 <a:solidFill>
                   <a:schemeClr val="bg1"/>
                 </a:solidFill>
@@ -4579,7 +4497,7 @@
           <p:nvPr>
             <p:extLst>
               <p:ext uri="{D42A27DB-BD31-4B8C-83A1-F6EECF244321}">
-                <p14:modId xmlns:p14="http://schemas.microsoft.com/office/powerpoint/2010/main" val="2428413517"/>
+                <p14:modId xmlns:p14="http://schemas.microsoft.com/office/powerpoint/2010/main" val="1593344717"/>
               </p:ext>
             </p:extLst>
           </p:nvPr>
@@ -4592,12 +4510,12 @@
           <a:graphicData uri="http://schemas.openxmlformats.org/presentationml/2006/ole">
             <mc:AlternateContent xmlns:mc="http://schemas.openxmlformats.org/markup-compatibility/2006">
               <mc:Choice xmlns:v="urn:schemas-microsoft-com:vml" Requires="v">
-                <p:oleObj spid="_x0000_s30729" name="Document" r:id="rId4" imgW="7313400" imgH="3837451" progId="Word.Document.12">
+                <p:oleObj spid="_x0000_s30733" name="Document" r:id="rId3" imgW="7301323" imgH="3845265" progId="Word.Document.12">
                   <p:embed/>
                 </p:oleObj>
               </mc:Choice>
               <mc:Fallback>
-                <p:oleObj name="Document" r:id="rId4" imgW="7313400" imgH="3837451" progId="Word.Document.12">
+                <p:oleObj name="Document" r:id="rId3" imgW="7301323" imgH="3845265" progId="Word.Document.12">
                   <p:embed/>
                   <p:pic>
                     <p:nvPicPr>
@@ -4606,7 +4524,7 @@
                       <p:nvPr/>
                     </p:nvPicPr>
                     <p:blipFill>
-                      <a:blip r:embed="rId5"/>
+                      <a:blip r:embed="rId4"/>
                       <a:stretch>
                         <a:fillRect/>
                       </a:stretch>
@@ -4637,13 +4555,6 @@
   <p:clrMapOvr>
     <a:masterClrMapping/>
   </p:clrMapOvr>
-  <p:timing>
-    <p:tnLst>
-      <p:par>
-        <p:cTn id="1" dur="indefinite" restart="never" nodeType="tmRoot"/>
-      </p:par>
-    </p:tnLst>
-  </p:timing>
 </p:sld>
 </file>
 
@@ -4723,12 +4634,12 @@
           <a:graphicData uri="http://schemas.openxmlformats.org/presentationml/2006/ole">
             <mc:AlternateContent xmlns:mc="http://schemas.openxmlformats.org/markup-compatibility/2006">
               <mc:Choice xmlns:v="urn:schemas-microsoft-com:vml" Requires="v">
-                <p:oleObj spid="_x0000_s31753" name="Document" r:id="rId4" imgW="7313400" imgH="2307292" progId="Word.Document.12">
+                <p:oleObj spid="_x0000_s31757" name="Document" r:id="rId3" imgW="7313400" imgH="2307292" progId="Word.Document.12">
                   <p:embed/>
                 </p:oleObj>
               </mc:Choice>
               <mc:Fallback>
-                <p:oleObj name="Document" r:id="rId4" imgW="7313400" imgH="2307292" progId="Word.Document.12">
+                <p:oleObj name="Document" r:id="rId3" imgW="7313400" imgH="2307292" progId="Word.Document.12">
                   <p:embed/>
                   <p:pic>
                     <p:nvPicPr>
@@ -4737,7 +4648,7 @@
                       <p:nvPr/>
                     </p:nvPicPr>
                     <p:blipFill>
-                      <a:blip r:embed="rId5"/>
+                      <a:blip r:embed="rId4"/>
                       <a:stretch>
                         <a:fillRect/>
                       </a:stretch>
@@ -4777,7 +4688,7 @@
               <a:defRPr/>
             </a:pPr>
             <a:r>
-              <a:rPr lang="en-US" smtClean="0"/>
+              <a:rPr lang="en-US"/>
               <a:t>Murach's JavaScript and jQuery (3rd Ed.)</a:t>
             </a:r>
             <a:endParaRPr lang="en-US" dirty="0"/>
@@ -4803,39 +4714,38 @@
               <a:defRPr/>
             </a:pPr>
             <a:r>
-              <a:rPr lang="en-US" smtClean="0"/>
+              <a:rPr lang="en-US"/>
               <a:t>© 2017, Mike Murach &amp; Associates, Inc.</a:t>
             </a:r>
+          </a:p>
+        </p:txBody>
+      </p:sp>
+      <p:sp>
+        <p:nvSpPr>
+          <p:cNvPr id="9" name="Slide Number Placeholder 8"/>
+          <p:cNvSpPr>
+            <a:spLocks noGrp="1"/>
+          </p:cNvSpPr>
+          <p:nvPr>
+            <p:ph type="sldNum" sz="quarter" idx="12"/>
+          </p:nvPr>
+        </p:nvSpPr>
+        <p:spPr/>
+        <p:txBody>
+          <a:bodyPr/>
+          <a:lstStyle/>
+          <a:p>
+            <a:pPr>
+              <a:defRPr/>
+            </a:pPr>
             <a:endParaRPr lang="en-US"/>
           </a:p>
-        </p:txBody>
-      </p:sp>
-      <p:sp>
-        <p:nvSpPr>
-          <p:cNvPr id="9" name="Slide Number Placeholder 8"/>
-          <p:cNvSpPr>
-            <a:spLocks noGrp="1"/>
-          </p:cNvSpPr>
-          <p:nvPr>
-            <p:ph type="sldNum" sz="quarter" idx="12"/>
-          </p:nvPr>
-        </p:nvSpPr>
-        <p:spPr/>
-        <p:txBody>
-          <a:bodyPr/>
-          <a:lstStyle/>
-          <a:p>
-            <a:pPr>
-              <a:defRPr/>
-            </a:pPr>
-            <a:endParaRPr lang="en-US" smtClean="0"/>
-          </a:p>
           <a:p>
             <a:pPr algn="r">
               <a:defRPr/>
             </a:pPr>
             <a:r>
-              <a:rPr lang="en-US" sz="900" smtClean="0">
+              <a:rPr lang="en-US" sz="900">
                 <a:solidFill>
                   <a:schemeClr val="bg1"/>
                 </a:solidFill>
@@ -4874,13 +4784,6 @@
   <p:clrMapOvr>
     <a:masterClrMapping/>
   </p:clrMapOvr>
-  <p:timing>
-    <p:tnLst>
-      <p:par>
-        <p:cTn id="1" dur="indefinite" restart="never" nodeType="tmRoot"/>
-      </p:par>
-    </p:tnLst>
-  </p:timing>
 </p:sld>
 </file>
 
@@ -4947,7 +4850,7 @@
               <a:defRPr/>
             </a:pPr>
             <a:r>
-              <a:rPr lang="en-US" smtClean="0"/>
+              <a:rPr lang="en-US"/>
               <a:t>Murach's JavaScript and jQuery (3rd Ed.)</a:t>
             </a:r>
             <a:endParaRPr lang="en-US" dirty="0"/>
@@ -4973,39 +4876,38 @@
               <a:defRPr/>
             </a:pPr>
             <a:r>
-              <a:rPr lang="en-US" smtClean="0"/>
+              <a:rPr lang="en-US"/>
               <a:t>© 2017, Mike Murach &amp; Associates, Inc.</a:t>
             </a:r>
+          </a:p>
+        </p:txBody>
+      </p:sp>
+      <p:sp>
+        <p:nvSpPr>
+          <p:cNvPr id="9" name="Slide Number Placeholder 8"/>
+          <p:cNvSpPr>
+            <a:spLocks noGrp="1"/>
+          </p:cNvSpPr>
+          <p:nvPr>
+            <p:ph type="sldNum" sz="quarter" idx="12"/>
+          </p:nvPr>
+        </p:nvSpPr>
+        <p:spPr/>
+        <p:txBody>
+          <a:bodyPr/>
+          <a:lstStyle/>
+          <a:p>
+            <a:pPr>
+              <a:defRPr/>
+            </a:pPr>
             <a:endParaRPr lang="en-US"/>
           </a:p>
-        </p:txBody>
-      </p:sp>
-      <p:sp>
-        <p:nvSpPr>
-          <p:cNvPr id="9" name="Slide Number Placeholder 8"/>
-          <p:cNvSpPr>
-            <a:spLocks noGrp="1"/>
-          </p:cNvSpPr>
-          <p:nvPr>
-            <p:ph type="sldNum" sz="quarter" idx="12"/>
-          </p:nvPr>
-        </p:nvSpPr>
-        <p:spPr/>
-        <p:txBody>
-          <a:bodyPr/>
-          <a:lstStyle/>
-          <a:p>
-            <a:pPr>
-              <a:defRPr/>
-            </a:pPr>
-            <a:endParaRPr lang="en-US" smtClean="0"/>
-          </a:p>
           <a:p>
             <a:pPr algn="r">
               <a:defRPr/>
             </a:pPr>
             <a:r>
-              <a:rPr lang="en-US" sz="900" smtClean="0">
+              <a:rPr lang="en-US" sz="900">
                 <a:solidFill>
                   <a:schemeClr val="bg1"/>
                 </a:solidFill>
@@ -5079,13 +4981,6 @@
   <p:clrMapOvr>
     <a:masterClrMapping/>
   </p:clrMapOvr>
-  <p:timing>
-    <p:tnLst>
-      <p:par>
-        <p:cTn id="1" dur="indefinite" restart="never" nodeType="tmRoot"/>
-      </p:par>
-    </p:tnLst>
-  </p:timing>
 </p:sld>
 </file>
 
@@ -5150,7 +5045,7 @@
           <a:graphicData uri="http://schemas.openxmlformats.org/presentationml/2006/ole">
             <mc:AlternateContent xmlns:mc="http://schemas.openxmlformats.org/markup-compatibility/2006">
               <mc:Choice xmlns:v="urn:schemas-microsoft-com:vml" Requires="v">
-                <p:oleObj spid="_x0000_s2060" name="Document" r:id="rId3" imgW="7301323" imgH="4420169" progId="Word.Document.12">
+                <p:oleObj spid="_x0000_s2064" name="Document" r:id="rId3" imgW="7301323" imgH="4420169" progId="Word.Document.12">
                   <p:embed/>
                 </p:oleObj>
               </mc:Choice>
@@ -5204,7 +5099,7 @@
               <a:defRPr/>
             </a:pPr>
             <a:r>
-              <a:rPr lang="en-US" smtClean="0"/>
+              <a:rPr lang="en-US"/>
               <a:t>Murach's JavaScript and jQuery (3rd Ed.)</a:t>
             </a:r>
             <a:endParaRPr lang="en-US" dirty="0"/>
@@ -5230,39 +5125,38 @@
               <a:defRPr/>
             </a:pPr>
             <a:r>
-              <a:rPr lang="en-US" smtClean="0"/>
+              <a:rPr lang="en-US"/>
               <a:t>© 2017, Mike Murach &amp; Associates, Inc.</a:t>
             </a:r>
+          </a:p>
+        </p:txBody>
+      </p:sp>
+      <p:sp>
+        <p:nvSpPr>
+          <p:cNvPr id="10" name="Slide Number Placeholder 9"/>
+          <p:cNvSpPr>
+            <a:spLocks noGrp="1"/>
+          </p:cNvSpPr>
+          <p:nvPr>
+            <p:ph type="sldNum" sz="quarter" idx="12"/>
+          </p:nvPr>
+        </p:nvSpPr>
+        <p:spPr/>
+        <p:txBody>
+          <a:bodyPr/>
+          <a:lstStyle/>
+          <a:p>
+            <a:pPr>
+              <a:defRPr/>
+            </a:pPr>
             <a:endParaRPr lang="en-US"/>
           </a:p>
-        </p:txBody>
-      </p:sp>
-      <p:sp>
-        <p:nvSpPr>
-          <p:cNvPr id="10" name="Slide Number Placeholder 9"/>
-          <p:cNvSpPr>
-            <a:spLocks noGrp="1"/>
-          </p:cNvSpPr>
-          <p:nvPr>
-            <p:ph type="sldNum" sz="quarter" idx="12"/>
-          </p:nvPr>
-        </p:nvSpPr>
-        <p:spPr/>
-        <p:txBody>
-          <a:bodyPr/>
-          <a:lstStyle/>
-          <a:p>
-            <a:pPr>
-              <a:defRPr/>
-            </a:pPr>
-            <a:endParaRPr lang="en-US" smtClean="0"/>
-          </a:p>
           <a:p>
             <a:pPr algn="r">
               <a:defRPr/>
             </a:pPr>
             <a:r>
-              <a:rPr lang="en-US" sz="900" smtClean="0">
+              <a:rPr lang="en-US" sz="900">
                 <a:solidFill>
                   <a:schemeClr val="bg1"/>
                 </a:solidFill>
@@ -5301,13 +5195,6 @@
   <p:clrMapOvr>
     <a:masterClrMapping/>
   </p:clrMapOvr>
-  <p:timing>
-    <p:tnLst>
-      <p:par>
-        <p:cTn id="1" dur="indefinite" restart="never" nodeType="tmRoot"/>
-      </p:par>
-    </p:tnLst>
-  </p:timing>
 </p:sld>
 </file>
 
@@ -5345,11 +5232,32 @@
           <a:p>
             <a:r>
               <a:rPr lang="en-US" dirty="0"/>
-              <a:t>The HTML for the </a:t>
-            </a:r>
-            <a:r>
-              <a:rPr lang="en-US" dirty="0" smtClean="0"/>
-              <a:t>Slide Show application</a:t>
+              <a:t>The HTML for the Slide Show application</a:t>
+            </a:r>
+          </a:p>
+        </p:txBody>
+      </p:sp>
+      <p:sp>
+        <p:nvSpPr>
+          <p:cNvPr id="7" name="Date Placeholder 6"/>
+          <p:cNvSpPr>
+            <a:spLocks noGrp="1"/>
+          </p:cNvSpPr>
+          <p:nvPr>
+            <p:ph type="dt" sz="half" idx="10"/>
+          </p:nvPr>
+        </p:nvSpPr>
+        <p:spPr/>
+        <p:txBody>
+          <a:bodyPr/>
+          <a:lstStyle/>
+          <a:p>
+            <a:pPr>
+              <a:defRPr/>
+            </a:pPr>
+            <a:r>
+              <a:rPr lang="en-US"/>
+              <a:t>Murach's JavaScript and jQuery (3rd Ed.)</a:t>
             </a:r>
             <a:endParaRPr lang="en-US" dirty="0"/>
           </a:p>
@@ -5357,32 +5265,6 @@
       </p:sp>
       <p:sp>
         <p:nvSpPr>
-          <p:cNvPr id="7" name="Date Placeholder 6"/>
-          <p:cNvSpPr>
-            <a:spLocks noGrp="1"/>
-          </p:cNvSpPr>
-          <p:nvPr>
-            <p:ph type="dt" sz="half" idx="10"/>
-          </p:nvPr>
-        </p:nvSpPr>
-        <p:spPr/>
-        <p:txBody>
-          <a:bodyPr/>
-          <a:lstStyle/>
-          <a:p>
-            <a:pPr>
-              <a:defRPr/>
-            </a:pPr>
-            <a:r>
-              <a:rPr lang="en-US" smtClean="0"/>
-              <a:t>Murach's JavaScript and jQuery (3rd Ed.)</a:t>
-            </a:r>
-            <a:endParaRPr lang="en-US" dirty="0"/>
-          </a:p>
-        </p:txBody>
-      </p:sp>
-      <p:sp>
-        <p:nvSpPr>
           <p:cNvPr id="8" name="Footer Placeholder 7"/>
           <p:cNvSpPr>
             <a:spLocks noGrp="1"/>
@@ -5400,39 +5282,38 @@
               <a:defRPr/>
             </a:pPr>
             <a:r>
-              <a:rPr lang="en-US" smtClean="0"/>
+              <a:rPr lang="en-US"/>
               <a:t>© 2017, Mike Murach &amp; Associates, Inc.</a:t>
             </a:r>
+          </a:p>
+        </p:txBody>
+      </p:sp>
+      <p:sp>
+        <p:nvSpPr>
+          <p:cNvPr id="9" name="Slide Number Placeholder 8"/>
+          <p:cNvSpPr>
+            <a:spLocks noGrp="1"/>
+          </p:cNvSpPr>
+          <p:nvPr>
+            <p:ph type="sldNum" sz="quarter" idx="12"/>
+          </p:nvPr>
+        </p:nvSpPr>
+        <p:spPr/>
+        <p:txBody>
+          <a:bodyPr/>
+          <a:lstStyle/>
+          <a:p>
+            <a:pPr>
+              <a:defRPr/>
+            </a:pPr>
             <a:endParaRPr lang="en-US"/>
           </a:p>
-        </p:txBody>
-      </p:sp>
-      <p:sp>
-        <p:nvSpPr>
-          <p:cNvPr id="9" name="Slide Number Placeholder 8"/>
-          <p:cNvSpPr>
-            <a:spLocks noGrp="1"/>
-          </p:cNvSpPr>
-          <p:nvPr>
-            <p:ph type="sldNum" sz="quarter" idx="12"/>
-          </p:nvPr>
-        </p:nvSpPr>
-        <p:spPr/>
-        <p:txBody>
-          <a:bodyPr/>
-          <a:lstStyle/>
-          <a:p>
-            <a:pPr>
-              <a:defRPr/>
-            </a:pPr>
-            <a:endParaRPr lang="en-US" smtClean="0"/>
-          </a:p>
           <a:p>
             <a:pPr algn="r">
               <a:defRPr/>
             </a:pPr>
             <a:r>
-              <a:rPr lang="en-US" sz="900" smtClean="0">
+              <a:rPr lang="en-US" sz="900">
                 <a:solidFill>
                   <a:schemeClr val="bg1"/>
                 </a:solidFill>
@@ -5483,12 +5364,12 @@
           <a:graphicData uri="http://schemas.openxmlformats.org/presentationml/2006/ole">
             <mc:AlternateContent xmlns:mc="http://schemas.openxmlformats.org/markup-compatibility/2006">
               <mc:Choice xmlns:v="urn:schemas-microsoft-com:vml" Requires="v">
-                <p:oleObj spid="_x0000_s32777" name="Document" r:id="rId4" imgW="7313400" imgH="4757777" progId="Word.Document.12">
+                <p:oleObj spid="_x0000_s32781" name="Document" r:id="rId3" imgW="7313400" imgH="4757777" progId="Word.Document.12">
                   <p:embed/>
                 </p:oleObj>
               </mc:Choice>
               <mc:Fallback>
-                <p:oleObj name="Document" r:id="rId4" imgW="7313400" imgH="4757777" progId="Word.Document.12">
+                <p:oleObj name="Document" r:id="rId3" imgW="7313400" imgH="4757777" progId="Word.Document.12">
                   <p:embed/>
                   <p:pic>
                     <p:nvPicPr>
@@ -5497,7 +5378,7 @@
                       <p:nvPr/>
                     </p:nvPicPr>
                     <p:blipFill>
-                      <a:blip r:embed="rId5"/>
+                      <a:blip r:embed="rId4"/>
                       <a:stretch>
                         <a:fillRect/>
                       </a:stretch>
@@ -5528,13 +5409,6 @@
   <p:clrMapOvr>
     <a:masterClrMapping/>
   </p:clrMapOvr>
-  <p:timing>
-    <p:tnLst>
-      <p:par>
-        <p:cTn id="1" dur="indefinite" restart="never" nodeType="tmRoot"/>
-      </p:par>
-    </p:tnLst>
-  </p:timing>
 </p:sld>
 </file>
 
@@ -5591,25 +5465,25 @@
           <p:nvPr>
             <p:extLst>
               <p:ext uri="{D42A27DB-BD31-4B8C-83A1-F6EECF244321}">
-                <p14:modId xmlns:p14="http://schemas.microsoft.com/office/powerpoint/2010/main" val="919245160"/>
+                <p14:modId xmlns:p14="http://schemas.microsoft.com/office/powerpoint/2010/main" val="1825582311"/>
               </p:ext>
             </p:extLst>
           </p:nvPr>
         </p:nvGraphicFramePr>
         <p:xfrm>
-          <a:off x="914400" y="1105951"/>
-          <a:ext cx="7313400" cy="4837649"/>
+          <a:off x="914400" y="1109663"/>
+          <a:ext cx="7253288" cy="4797425"/>
         </p:xfrm>
         <a:graphic>
           <a:graphicData uri="http://schemas.openxmlformats.org/presentationml/2006/ole">
             <mc:AlternateContent xmlns:mc="http://schemas.openxmlformats.org/markup-compatibility/2006">
               <mc:Choice xmlns:v="urn:schemas-microsoft-com:vml" Requires="v">
-                <p:oleObj spid="_x0000_s33801" name="Document" r:id="rId4" imgW="7313400" imgH="4837649" progId="Word.Document.12">
+                <p:oleObj spid="_x0000_s33805" name="Document" r:id="rId3" imgW="7301323" imgH="4843895" progId="Word.Document.12">
                   <p:embed/>
                 </p:oleObj>
               </mc:Choice>
               <mc:Fallback>
-                <p:oleObj name="Document" r:id="rId4" imgW="7313400" imgH="4837649" progId="Word.Document.12">
+                <p:oleObj name="Document" r:id="rId3" imgW="7301323" imgH="4843895" progId="Word.Document.12">
                   <p:embed/>
                   <p:pic>
                     <p:nvPicPr>
@@ -5618,15 +5492,15 @@
                       <p:nvPr/>
                     </p:nvPicPr>
                     <p:blipFill>
-                      <a:blip r:embed="rId5"/>
+                      <a:blip r:embed="rId4"/>
                       <a:stretch>
                         <a:fillRect/>
                       </a:stretch>
                     </p:blipFill>
                     <p:spPr>
                       <a:xfrm>
-                        <a:off x="914400" y="1105951"/>
-                        <a:ext cx="7313400" cy="4837649"/>
+                        <a:off x="914400" y="1109663"/>
+                        <a:ext cx="7253288" cy="4797425"/>
                       </a:xfrm>
                       <a:prstGeom prst="rect">
                         <a:avLst/>
@@ -5658,7 +5532,7 @@
               <a:defRPr/>
             </a:pPr>
             <a:r>
-              <a:rPr lang="en-US" smtClean="0"/>
+              <a:rPr lang="en-US"/>
               <a:t>Murach's JavaScript and jQuery (3rd Ed.)</a:t>
             </a:r>
             <a:endParaRPr lang="en-US" dirty="0"/>
@@ -5684,39 +5558,38 @@
               <a:defRPr/>
             </a:pPr>
             <a:r>
-              <a:rPr lang="en-US" smtClean="0"/>
+              <a:rPr lang="en-US"/>
               <a:t>© 2017, Mike Murach &amp; Associates, Inc.</a:t>
             </a:r>
+          </a:p>
+        </p:txBody>
+      </p:sp>
+      <p:sp>
+        <p:nvSpPr>
+          <p:cNvPr id="9" name="Slide Number Placeholder 8"/>
+          <p:cNvSpPr>
+            <a:spLocks noGrp="1"/>
+          </p:cNvSpPr>
+          <p:nvPr>
+            <p:ph type="sldNum" sz="quarter" idx="12"/>
+          </p:nvPr>
+        </p:nvSpPr>
+        <p:spPr/>
+        <p:txBody>
+          <a:bodyPr/>
+          <a:lstStyle/>
+          <a:p>
+            <a:pPr>
+              <a:defRPr/>
+            </a:pPr>
             <a:endParaRPr lang="en-US"/>
           </a:p>
-        </p:txBody>
-      </p:sp>
-      <p:sp>
-        <p:nvSpPr>
-          <p:cNvPr id="9" name="Slide Number Placeholder 8"/>
-          <p:cNvSpPr>
-            <a:spLocks noGrp="1"/>
-          </p:cNvSpPr>
-          <p:nvPr>
-            <p:ph type="sldNum" sz="quarter" idx="12"/>
-          </p:nvPr>
-        </p:nvSpPr>
-        <p:spPr/>
-        <p:txBody>
-          <a:bodyPr/>
-          <a:lstStyle/>
-          <a:p>
-            <a:pPr>
-              <a:defRPr/>
-            </a:pPr>
-            <a:endParaRPr lang="en-US" smtClean="0"/>
-          </a:p>
           <a:p>
             <a:pPr algn="r">
               <a:defRPr/>
             </a:pPr>
             <a:r>
-              <a:rPr lang="en-US" sz="900" smtClean="0">
+              <a:rPr lang="en-US" sz="900">
                 <a:solidFill>
                   <a:schemeClr val="bg1"/>
                 </a:solidFill>
@@ -5755,13 +5628,6 @@
   <p:clrMapOvr>
     <a:masterClrMapping/>
   </p:clrMapOvr>
-  <p:timing>
-    <p:tnLst>
-      <p:par>
-        <p:cTn id="1" dur="indefinite" restart="never" nodeType="tmRoot"/>
-      </p:par>
-    </p:tnLst>
-  </p:timing>
 </p:sld>
 </file>
 
@@ -5818,7 +5684,7 @@
           <p:nvPr>
             <p:extLst>
               <p:ext uri="{D42A27DB-BD31-4B8C-83A1-F6EECF244321}">
-                <p14:modId xmlns:p14="http://schemas.microsoft.com/office/powerpoint/2010/main" val="1857729462"/>
+                <p14:modId xmlns:p14="http://schemas.microsoft.com/office/powerpoint/2010/main" val="972213185"/>
               </p:ext>
             </p:extLst>
           </p:nvPr>
@@ -5831,12 +5697,12 @@
           <a:graphicData uri="http://schemas.openxmlformats.org/presentationml/2006/ole">
             <mc:AlternateContent xmlns:mc="http://schemas.openxmlformats.org/markup-compatibility/2006">
               <mc:Choice xmlns:v="urn:schemas-microsoft-com:vml" Requires="v">
-                <p:oleObj spid="_x0000_s34825" name="Document" r:id="rId4" imgW="7313400" imgH="3457520" progId="Word.Document.12">
+                <p:oleObj spid="_x0000_s34829" name="Document" r:id="rId3" imgW="7301323" imgH="3464560" progId="Word.Document.12">
                   <p:embed/>
                 </p:oleObj>
               </mc:Choice>
               <mc:Fallback>
-                <p:oleObj name="Document" r:id="rId4" imgW="7313400" imgH="3457520" progId="Word.Document.12">
+                <p:oleObj name="Document" r:id="rId3" imgW="7301323" imgH="3464560" progId="Word.Document.12">
                   <p:embed/>
                   <p:pic>
                     <p:nvPicPr>
@@ -5845,7 +5711,7 @@
                       <p:nvPr/>
                     </p:nvPicPr>
                     <p:blipFill>
-                      <a:blip r:embed="rId5"/>
+                      <a:blip r:embed="rId4"/>
                       <a:stretch>
                         <a:fillRect/>
                       </a:stretch>
@@ -5885,7 +5751,7 @@
               <a:defRPr/>
             </a:pPr>
             <a:r>
-              <a:rPr lang="en-US" smtClean="0"/>
+              <a:rPr lang="en-US"/>
               <a:t>Murach's JavaScript and jQuery (3rd Ed.)</a:t>
             </a:r>
             <a:endParaRPr lang="en-US" dirty="0"/>
@@ -5911,39 +5777,38 @@
               <a:defRPr/>
             </a:pPr>
             <a:r>
-              <a:rPr lang="en-US" smtClean="0"/>
+              <a:rPr lang="en-US"/>
               <a:t>© 2017, Mike Murach &amp; Associates, Inc.</a:t>
             </a:r>
+          </a:p>
+        </p:txBody>
+      </p:sp>
+      <p:sp>
+        <p:nvSpPr>
+          <p:cNvPr id="9" name="Slide Number Placeholder 8"/>
+          <p:cNvSpPr>
+            <a:spLocks noGrp="1"/>
+          </p:cNvSpPr>
+          <p:nvPr>
+            <p:ph type="sldNum" sz="quarter" idx="12"/>
+          </p:nvPr>
+        </p:nvSpPr>
+        <p:spPr/>
+        <p:txBody>
+          <a:bodyPr/>
+          <a:lstStyle/>
+          <a:p>
+            <a:pPr>
+              <a:defRPr/>
+            </a:pPr>
             <a:endParaRPr lang="en-US"/>
           </a:p>
-        </p:txBody>
-      </p:sp>
-      <p:sp>
-        <p:nvSpPr>
-          <p:cNvPr id="9" name="Slide Number Placeholder 8"/>
-          <p:cNvSpPr>
-            <a:spLocks noGrp="1"/>
-          </p:cNvSpPr>
-          <p:nvPr>
-            <p:ph type="sldNum" sz="quarter" idx="12"/>
-          </p:nvPr>
-        </p:nvSpPr>
-        <p:spPr/>
-        <p:txBody>
-          <a:bodyPr/>
-          <a:lstStyle/>
-          <a:p>
-            <a:pPr>
-              <a:defRPr/>
-            </a:pPr>
-            <a:endParaRPr lang="en-US" smtClean="0"/>
-          </a:p>
           <a:p>
             <a:pPr algn="r">
               <a:defRPr/>
             </a:pPr>
             <a:r>
-              <a:rPr lang="en-US" sz="900" smtClean="0">
+              <a:rPr lang="en-US" sz="900">
                 <a:solidFill>
                   <a:schemeClr val="bg1"/>
                 </a:solidFill>
@@ -5982,18 +5847,11 @@
   <p:clrMapOvr>
     <a:masterClrMapping/>
   </p:clrMapOvr>
-  <p:timing>
-    <p:tnLst>
-      <p:par>
-        <p:cTn id="1" dur="indefinite" restart="never" nodeType="tmRoot"/>
-      </p:par>
-    </p:tnLst>
-  </p:timing>
 </p:sld>
 </file>
 
 <file path=ppt/slides/slide23.xml><?xml version="1.0" encoding="utf-8"?>
-<p:sld xmlns:a="http://schemas.openxmlformats.org/drawingml/2006/main" xmlns:r="http://schemas.openxmlformats.org/officeDocument/2006/relationships" xmlns:p="http://schemas.openxmlformats.org/presentationml/2006/main">
+<p:sld xmlns:a="http://schemas.openxmlformats.org/drawingml/2006/main" xmlns:r="http://schemas.openxmlformats.org/officeDocument/2006/relationships" xmlns:p="http://schemas.openxmlformats.org/presentationml/2006/main" show="0">
   <p:cSld>
     <p:spTree>
       <p:nvGrpSpPr>
@@ -6055,7 +5913,7 @@
               <a:defRPr/>
             </a:pPr>
             <a:r>
-              <a:rPr lang="en-US" smtClean="0"/>
+              <a:rPr lang="en-US"/>
               <a:t>Murach's JavaScript and jQuery (3rd Ed.)</a:t>
             </a:r>
             <a:endParaRPr lang="en-US" dirty="0"/>
@@ -6081,39 +5939,38 @@
               <a:defRPr/>
             </a:pPr>
             <a:r>
-              <a:rPr lang="en-US" smtClean="0"/>
+              <a:rPr lang="en-US"/>
               <a:t>© 2017, Mike Murach &amp; Associates, Inc.</a:t>
             </a:r>
+          </a:p>
+        </p:txBody>
+      </p:sp>
+      <p:sp>
+        <p:nvSpPr>
+          <p:cNvPr id="10" name="Slide Number Placeholder 9"/>
+          <p:cNvSpPr>
+            <a:spLocks noGrp="1"/>
+          </p:cNvSpPr>
+          <p:nvPr>
+            <p:ph type="sldNum" sz="quarter" idx="12"/>
+          </p:nvPr>
+        </p:nvSpPr>
+        <p:spPr/>
+        <p:txBody>
+          <a:bodyPr/>
+          <a:lstStyle/>
+          <a:p>
+            <a:pPr>
+              <a:defRPr/>
+            </a:pPr>
             <a:endParaRPr lang="en-US"/>
           </a:p>
-        </p:txBody>
-      </p:sp>
-      <p:sp>
-        <p:nvSpPr>
-          <p:cNvPr id="10" name="Slide Number Placeholder 9"/>
-          <p:cNvSpPr>
-            <a:spLocks noGrp="1"/>
-          </p:cNvSpPr>
-          <p:nvPr>
-            <p:ph type="sldNum" sz="quarter" idx="12"/>
-          </p:nvPr>
-        </p:nvSpPr>
-        <p:spPr/>
-        <p:txBody>
-          <a:bodyPr/>
-          <a:lstStyle/>
-          <a:p>
-            <a:pPr>
-              <a:defRPr/>
-            </a:pPr>
-            <a:endParaRPr lang="en-US" smtClean="0"/>
-          </a:p>
           <a:p>
             <a:pPr algn="r">
               <a:defRPr/>
             </a:pPr>
             <a:r>
-              <a:rPr lang="en-US" sz="900" smtClean="0">
+              <a:rPr lang="en-US" sz="900">
                 <a:solidFill>
                   <a:schemeClr val="bg1"/>
                 </a:solidFill>
@@ -6164,12 +6021,12 @@
           <a:graphicData uri="http://schemas.openxmlformats.org/presentationml/2006/ole">
             <mc:AlternateContent xmlns:mc="http://schemas.openxmlformats.org/markup-compatibility/2006">
               <mc:Choice xmlns:v="urn:schemas-microsoft-com:vml" Requires="v">
-                <p:oleObj spid="_x0000_s39945" name="Document" r:id="rId4" imgW="7313400" imgH="4494776" progId="Word.Document.12">
+                <p:oleObj spid="_x0000_s39949" name="Document" r:id="rId3" imgW="7313400" imgH="4494776" progId="Word.Document.12">
                   <p:embed/>
                 </p:oleObj>
               </mc:Choice>
               <mc:Fallback>
-                <p:oleObj name="Document" r:id="rId4" imgW="7313400" imgH="4494776" progId="Word.Document.12">
+                <p:oleObj name="Document" r:id="rId3" imgW="7313400" imgH="4494776" progId="Word.Document.12">
                   <p:embed/>
                   <p:pic>
                     <p:nvPicPr>
@@ -6178,7 +6035,7 @@
                       <p:nvPr/>
                     </p:nvPicPr>
                     <p:blipFill>
-                      <a:blip r:embed="rId5"/>
+                      <a:blip r:embed="rId4"/>
                       <a:stretch>
                         <a:fillRect/>
                       </a:stretch>
@@ -6209,18 +6066,11 @@
   <p:clrMapOvr>
     <a:masterClrMapping/>
   </p:clrMapOvr>
-  <p:timing>
-    <p:tnLst>
-      <p:par>
-        <p:cTn id="1" dur="indefinite" restart="never" nodeType="tmRoot"/>
-      </p:par>
-    </p:tnLst>
-  </p:timing>
 </p:sld>
 </file>
 
 <file path=ppt/slides/slide24.xml><?xml version="1.0" encoding="utf-8"?>
-<p:sld xmlns:a="http://schemas.openxmlformats.org/drawingml/2006/main" xmlns:r="http://schemas.openxmlformats.org/officeDocument/2006/relationships" xmlns:p="http://schemas.openxmlformats.org/presentationml/2006/main">
+<p:sld xmlns:a="http://schemas.openxmlformats.org/drawingml/2006/main" xmlns:r="http://schemas.openxmlformats.org/officeDocument/2006/relationships" xmlns:p="http://schemas.openxmlformats.org/presentationml/2006/main" show="0">
   <p:cSld>
     <p:spTree>
       <p:nvGrpSpPr>
@@ -6282,7 +6132,7 @@
               <a:defRPr/>
             </a:pPr>
             <a:r>
-              <a:rPr lang="en-US" smtClean="0"/>
+              <a:rPr lang="en-US"/>
               <a:t>Murach's JavaScript and jQuery (3rd Ed.)</a:t>
             </a:r>
             <a:endParaRPr lang="en-US" dirty="0"/>
@@ -6308,39 +6158,38 @@
               <a:defRPr/>
             </a:pPr>
             <a:r>
-              <a:rPr lang="en-US" smtClean="0"/>
+              <a:rPr lang="en-US"/>
               <a:t>© 2017, Mike Murach &amp; Associates, Inc.</a:t>
             </a:r>
+          </a:p>
+        </p:txBody>
+      </p:sp>
+      <p:sp>
+        <p:nvSpPr>
+          <p:cNvPr id="10" name="Slide Number Placeholder 9"/>
+          <p:cNvSpPr>
+            <a:spLocks noGrp="1"/>
+          </p:cNvSpPr>
+          <p:nvPr>
+            <p:ph type="sldNum" sz="quarter" idx="12"/>
+          </p:nvPr>
+        </p:nvSpPr>
+        <p:spPr/>
+        <p:txBody>
+          <a:bodyPr/>
+          <a:lstStyle/>
+          <a:p>
+            <a:pPr>
+              <a:defRPr/>
+            </a:pPr>
             <a:endParaRPr lang="en-US"/>
           </a:p>
-        </p:txBody>
-      </p:sp>
-      <p:sp>
-        <p:nvSpPr>
-          <p:cNvPr id="10" name="Slide Number Placeholder 9"/>
-          <p:cNvSpPr>
-            <a:spLocks noGrp="1"/>
-          </p:cNvSpPr>
-          <p:nvPr>
-            <p:ph type="sldNum" sz="quarter" idx="12"/>
-          </p:nvPr>
-        </p:nvSpPr>
-        <p:spPr/>
-        <p:txBody>
-          <a:bodyPr/>
-          <a:lstStyle/>
-          <a:p>
-            <a:pPr>
-              <a:defRPr/>
-            </a:pPr>
-            <a:endParaRPr lang="en-US" smtClean="0"/>
-          </a:p>
           <a:p>
             <a:pPr algn="r">
               <a:defRPr/>
             </a:pPr>
             <a:r>
-              <a:rPr lang="en-US" sz="900" smtClean="0">
+              <a:rPr lang="en-US" sz="900">
                 <a:solidFill>
                   <a:schemeClr val="bg1"/>
                 </a:solidFill>
@@ -6391,12 +6240,12 @@
           <a:graphicData uri="http://schemas.openxmlformats.org/presentationml/2006/ole">
             <mc:AlternateContent xmlns:mc="http://schemas.openxmlformats.org/markup-compatibility/2006">
               <mc:Choice xmlns:v="urn:schemas-microsoft-com:vml" Requires="v">
-                <p:oleObj spid="_x0000_s40969" name="Document" r:id="rId4" imgW="7313400" imgH="4958177" progId="Word.Document.12">
+                <p:oleObj spid="_x0000_s40973" name="Document" r:id="rId3" imgW="7313400" imgH="4958177" progId="Word.Document.12">
                   <p:embed/>
                 </p:oleObj>
               </mc:Choice>
               <mc:Fallback>
-                <p:oleObj name="Document" r:id="rId4" imgW="7313400" imgH="4958177" progId="Word.Document.12">
+                <p:oleObj name="Document" r:id="rId3" imgW="7313400" imgH="4958177" progId="Word.Document.12">
                   <p:embed/>
                   <p:pic>
                     <p:nvPicPr>
@@ -6405,7 +6254,7 @@
                       <p:nvPr/>
                     </p:nvPicPr>
                     <p:blipFill>
-                      <a:blip r:embed="rId5"/>
+                      <a:blip r:embed="rId4"/>
                       <a:stretch>
                         <a:fillRect/>
                       </a:stretch>
@@ -6436,18 +6285,11 @@
   <p:clrMapOvr>
     <a:masterClrMapping/>
   </p:clrMapOvr>
-  <p:timing>
-    <p:tnLst>
-      <p:par>
-        <p:cTn id="1" dur="indefinite" restart="never" nodeType="tmRoot"/>
-      </p:par>
-    </p:tnLst>
-  </p:timing>
 </p:sld>
 </file>
 
 <file path=ppt/slides/slide25.xml><?xml version="1.0" encoding="utf-8"?>
-<p:sld xmlns:a="http://schemas.openxmlformats.org/drawingml/2006/main" xmlns:r="http://schemas.openxmlformats.org/officeDocument/2006/relationships" xmlns:p="http://schemas.openxmlformats.org/presentationml/2006/main">
+<p:sld xmlns:a="http://schemas.openxmlformats.org/drawingml/2006/main" xmlns:r="http://schemas.openxmlformats.org/officeDocument/2006/relationships" xmlns:p="http://schemas.openxmlformats.org/presentationml/2006/main" show="0">
   <p:cSld>
     <p:spTree>
       <p:nvGrpSpPr>
@@ -6509,7 +6351,7 @@
               <a:defRPr/>
             </a:pPr>
             <a:r>
-              <a:rPr lang="en-US" smtClean="0"/>
+              <a:rPr lang="en-US"/>
               <a:t>Murach's JavaScript and jQuery (3rd Ed.)</a:t>
             </a:r>
             <a:endParaRPr lang="en-US" dirty="0"/>
@@ -6535,39 +6377,38 @@
               <a:defRPr/>
             </a:pPr>
             <a:r>
-              <a:rPr lang="en-US" smtClean="0"/>
+              <a:rPr lang="en-US"/>
               <a:t>© 2017, Mike Murach &amp; Associates, Inc.</a:t>
             </a:r>
+          </a:p>
+        </p:txBody>
+      </p:sp>
+      <p:sp>
+        <p:nvSpPr>
+          <p:cNvPr id="10" name="Slide Number Placeholder 9"/>
+          <p:cNvSpPr>
+            <a:spLocks noGrp="1"/>
+          </p:cNvSpPr>
+          <p:nvPr>
+            <p:ph type="sldNum" sz="quarter" idx="12"/>
+          </p:nvPr>
+        </p:nvSpPr>
+        <p:spPr/>
+        <p:txBody>
+          <a:bodyPr/>
+          <a:lstStyle/>
+          <a:p>
+            <a:pPr>
+              <a:defRPr/>
+            </a:pPr>
             <a:endParaRPr lang="en-US"/>
           </a:p>
-        </p:txBody>
-      </p:sp>
-      <p:sp>
-        <p:nvSpPr>
-          <p:cNvPr id="10" name="Slide Number Placeholder 9"/>
-          <p:cNvSpPr>
-            <a:spLocks noGrp="1"/>
-          </p:cNvSpPr>
-          <p:nvPr>
-            <p:ph type="sldNum" sz="quarter" idx="12"/>
-          </p:nvPr>
-        </p:nvSpPr>
-        <p:spPr/>
-        <p:txBody>
-          <a:bodyPr/>
-          <a:lstStyle/>
-          <a:p>
-            <a:pPr>
-              <a:defRPr/>
-            </a:pPr>
-            <a:endParaRPr lang="en-US" smtClean="0"/>
-          </a:p>
           <a:p>
             <a:pPr algn="r">
               <a:defRPr/>
             </a:pPr>
             <a:r>
-              <a:rPr lang="en-US" sz="900" smtClean="0">
+              <a:rPr lang="en-US" sz="900">
                 <a:solidFill>
                   <a:schemeClr val="bg1"/>
                 </a:solidFill>
@@ -6618,12 +6459,12 @@
           <a:graphicData uri="http://schemas.openxmlformats.org/presentationml/2006/ole">
             <mc:AlternateContent xmlns:mc="http://schemas.openxmlformats.org/markup-compatibility/2006">
               <mc:Choice xmlns:v="urn:schemas-microsoft-com:vml" Requires="v">
-                <p:oleObj spid="_x0000_s41992" name="Document" r:id="rId4" imgW="7313400" imgH="2544749" progId="Word.Document.12">
+                <p:oleObj spid="_x0000_s41996" name="Document" r:id="rId3" imgW="7313400" imgH="2544749" progId="Word.Document.12">
                   <p:embed/>
                 </p:oleObj>
               </mc:Choice>
               <mc:Fallback>
-                <p:oleObj name="Document" r:id="rId4" imgW="7313400" imgH="2544749" progId="Word.Document.12">
+                <p:oleObj name="Document" r:id="rId3" imgW="7313400" imgH="2544749" progId="Word.Document.12">
                   <p:embed/>
                   <p:pic>
                     <p:nvPicPr>
@@ -6632,7 +6473,7 @@
                       <p:nvPr/>
                     </p:nvPicPr>
                     <p:blipFill>
-                      <a:blip r:embed="rId5"/>
+                      <a:blip r:embed="rId4"/>
                       <a:stretch>
                         <a:fillRect/>
                       </a:stretch>
@@ -6663,18 +6504,11 @@
   <p:clrMapOvr>
     <a:masterClrMapping/>
   </p:clrMapOvr>
-  <p:timing>
-    <p:tnLst>
-      <p:par>
-        <p:cTn id="1" dur="indefinite" restart="never" nodeType="tmRoot"/>
-      </p:par>
-    </p:tnLst>
-  </p:timing>
 </p:sld>
 </file>
 
 <file path=ppt/slides/slide26.xml><?xml version="1.0" encoding="utf-8"?>
-<p:sld xmlns:a="http://schemas.openxmlformats.org/drawingml/2006/main" xmlns:r="http://schemas.openxmlformats.org/officeDocument/2006/relationships" xmlns:p="http://schemas.openxmlformats.org/presentationml/2006/main">
+<p:sld xmlns:a="http://schemas.openxmlformats.org/drawingml/2006/main" xmlns:r="http://schemas.openxmlformats.org/officeDocument/2006/relationships" xmlns:p="http://schemas.openxmlformats.org/presentationml/2006/main" show="0">
   <p:cSld>
     <p:spTree>
       <p:nvGrpSpPr>
@@ -6736,7 +6570,7 @@
               <a:defRPr/>
             </a:pPr>
             <a:r>
-              <a:rPr lang="en-US" smtClean="0"/>
+              <a:rPr lang="en-US"/>
               <a:t>Murach's JavaScript and jQuery (3rd Ed.)</a:t>
             </a:r>
             <a:endParaRPr lang="en-US" dirty="0"/>
@@ -6762,39 +6596,38 @@
               <a:defRPr/>
             </a:pPr>
             <a:r>
-              <a:rPr lang="en-US" smtClean="0"/>
+              <a:rPr lang="en-US"/>
               <a:t>© 2017, Mike Murach &amp; Associates, Inc.</a:t>
             </a:r>
+          </a:p>
+        </p:txBody>
+      </p:sp>
+      <p:sp>
+        <p:nvSpPr>
+          <p:cNvPr id="10" name="Slide Number Placeholder 9"/>
+          <p:cNvSpPr>
+            <a:spLocks noGrp="1"/>
+          </p:cNvSpPr>
+          <p:nvPr>
+            <p:ph type="sldNum" sz="quarter" idx="12"/>
+          </p:nvPr>
+        </p:nvSpPr>
+        <p:spPr/>
+        <p:txBody>
+          <a:bodyPr/>
+          <a:lstStyle/>
+          <a:p>
+            <a:pPr>
+              <a:defRPr/>
+            </a:pPr>
             <a:endParaRPr lang="en-US"/>
           </a:p>
-        </p:txBody>
-      </p:sp>
-      <p:sp>
-        <p:nvSpPr>
-          <p:cNvPr id="10" name="Slide Number Placeholder 9"/>
-          <p:cNvSpPr>
-            <a:spLocks noGrp="1"/>
-          </p:cNvSpPr>
-          <p:nvPr>
-            <p:ph type="sldNum" sz="quarter" idx="12"/>
-          </p:nvPr>
-        </p:nvSpPr>
-        <p:spPr/>
-        <p:txBody>
-          <a:bodyPr/>
-          <a:lstStyle/>
-          <a:p>
-            <a:pPr>
-              <a:defRPr/>
-            </a:pPr>
-            <a:endParaRPr lang="en-US" smtClean="0"/>
-          </a:p>
           <a:p>
             <a:pPr algn="r">
               <a:defRPr/>
             </a:pPr>
             <a:r>
-              <a:rPr lang="en-US" sz="900" smtClean="0">
+              <a:rPr lang="en-US" sz="900">
                 <a:solidFill>
                   <a:schemeClr val="bg1"/>
                 </a:solidFill>
@@ -6845,12 +6678,12 @@
           <a:graphicData uri="http://schemas.openxmlformats.org/presentationml/2006/ole">
             <mc:AlternateContent xmlns:mc="http://schemas.openxmlformats.org/markup-compatibility/2006">
               <mc:Choice xmlns:v="urn:schemas-microsoft-com:vml" Requires="v">
-                <p:oleObj spid="_x0000_s43016" name="Document" r:id="rId4" imgW="7313400" imgH="2919284" progId="Word.Document.12">
+                <p:oleObj spid="_x0000_s43020" name="Document" r:id="rId3" imgW="7313400" imgH="2919284" progId="Word.Document.12">
                   <p:embed/>
                 </p:oleObj>
               </mc:Choice>
               <mc:Fallback>
-                <p:oleObj name="Document" r:id="rId4" imgW="7313400" imgH="2919284" progId="Word.Document.12">
+                <p:oleObj name="Document" r:id="rId3" imgW="7313400" imgH="2919284" progId="Word.Document.12">
                   <p:embed/>
                   <p:pic>
                     <p:nvPicPr>
@@ -6859,7 +6692,7 @@
                       <p:nvPr/>
                     </p:nvPicPr>
                     <p:blipFill>
-                      <a:blip r:embed="rId5"/>
+                      <a:blip r:embed="rId4"/>
                       <a:stretch>
                         <a:fillRect/>
                       </a:stretch>
@@ -6890,18 +6723,11 @@
   <p:clrMapOvr>
     <a:masterClrMapping/>
   </p:clrMapOvr>
-  <p:timing>
-    <p:tnLst>
-      <p:par>
-        <p:cTn id="1" dur="indefinite" restart="never" nodeType="tmRoot"/>
-      </p:par>
-    </p:tnLst>
-  </p:timing>
 </p:sld>
 </file>
 
 <file path=ppt/slides/slide27.xml><?xml version="1.0" encoding="utf-8"?>
-<p:sld xmlns:a="http://schemas.openxmlformats.org/drawingml/2006/main" xmlns:r="http://schemas.openxmlformats.org/officeDocument/2006/relationships" xmlns:p="http://schemas.openxmlformats.org/presentationml/2006/main">
+<p:sld xmlns:a="http://schemas.openxmlformats.org/drawingml/2006/main" xmlns:r="http://schemas.openxmlformats.org/officeDocument/2006/relationships" xmlns:p="http://schemas.openxmlformats.org/presentationml/2006/main" show="0">
   <p:cSld>
     <p:spTree>
       <p:nvGrpSpPr>
@@ -6963,7 +6789,7 @@
               <a:defRPr/>
             </a:pPr>
             <a:r>
-              <a:rPr lang="en-US" smtClean="0"/>
+              <a:rPr lang="en-US"/>
               <a:t>Murach's JavaScript and jQuery (3rd Ed.)</a:t>
             </a:r>
             <a:endParaRPr lang="en-US" dirty="0"/>
@@ -6989,39 +6815,38 @@
               <a:defRPr/>
             </a:pPr>
             <a:r>
-              <a:rPr lang="en-US" smtClean="0"/>
+              <a:rPr lang="en-US"/>
               <a:t>© 2017, Mike Murach &amp; Associates, Inc.</a:t>
             </a:r>
+          </a:p>
+        </p:txBody>
+      </p:sp>
+      <p:sp>
+        <p:nvSpPr>
+          <p:cNvPr id="10" name="Slide Number Placeholder 9"/>
+          <p:cNvSpPr>
+            <a:spLocks noGrp="1"/>
+          </p:cNvSpPr>
+          <p:nvPr>
+            <p:ph type="sldNum" sz="quarter" idx="12"/>
+          </p:nvPr>
+        </p:nvSpPr>
+        <p:spPr/>
+        <p:txBody>
+          <a:bodyPr/>
+          <a:lstStyle/>
+          <a:p>
+            <a:pPr>
+              <a:defRPr/>
+            </a:pPr>
             <a:endParaRPr lang="en-US"/>
           </a:p>
-        </p:txBody>
-      </p:sp>
-      <p:sp>
-        <p:nvSpPr>
-          <p:cNvPr id="10" name="Slide Number Placeholder 9"/>
-          <p:cNvSpPr>
-            <a:spLocks noGrp="1"/>
-          </p:cNvSpPr>
-          <p:nvPr>
-            <p:ph type="sldNum" sz="quarter" idx="12"/>
-          </p:nvPr>
-        </p:nvSpPr>
-        <p:spPr/>
-        <p:txBody>
-          <a:bodyPr/>
-          <a:lstStyle/>
-          <a:p>
-            <a:pPr>
-              <a:defRPr/>
-            </a:pPr>
-            <a:endParaRPr lang="en-US" smtClean="0"/>
-          </a:p>
           <a:p>
             <a:pPr algn="r">
               <a:defRPr/>
             </a:pPr>
             <a:r>
-              <a:rPr lang="en-US" sz="900" smtClean="0">
+              <a:rPr lang="en-US" sz="900">
                 <a:solidFill>
                   <a:schemeClr val="bg1"/>
                 </a:solidFill>
@@ -7072,12 +6897,12 @@
           <a:graphicData uri="http://schemas.openxmlformats.org/presentationml/2006/ole">
             <mc:AlternateContent xmlns:mc="http://schemas.openxmlformats.org/markup-compatibility/2006">
               <mc:Choice xmlns:v="urn:schemas-microsoft-com:vml" Requires="v">
-                <p:oleObj spid="_x0000_s44040" name="Document" r:id="rId4" imgW="7313400" imgH="3794997" progId="Word.Document.12">
+                <p:oleObj spid="_x0000_s44044" name="Document" r:id="rId3" imgW="7313400" imgH="3794997" progId="Word.Document.12">
                   <p:embed/>
                 </p:oleObj>
               </mc:Choice>
               <mc:Fallback>
-                <p:oleObj name="Document" r:id="rId4" imgW="7313400" imgH="3794997" progId="Word.Document.12">
+                <p:oleObj name="Document" r:id="rId3" imgW="7313400" imgH="3794997" progId="Word.Document.12">
                   <p:embed/>
                   <p:pic>
                     <p:nvPicPr>
@@ -7086,7 +6911,7 @@
                       <p:nvPr/>
                     </p:nvPicPr>
                     <p:blipFill>
-                      <a:blip r:embed="rId5"/>
+                      <a:blip r:embed="rId4"/>
                       <a:stretch>
                         <a:fillRect/>
                       </a:stretch>
@@ -7117,13 +6942,6 @@
   <p:clrMapOvr>
     <a:masterClrMapping/>
   </p:clrMapOvr>
-  <p:timing>
-    <p:tnLst>
-      <p:par>
-        <p:cTn id="1" dur="indefinite" restart="never" nodeType="tmRoot"/>
-      </p:par>
-    </p:tnLst>
-  </p:timing>
 </p:sld>
 </file>
 
@@ -7188,12 +7006,12 @@
           <a:graphicData uri="http://schemas.openxmlformats.org/presentationml/2006/ole">
             <mc:AlternateContent xmlns:mc="http://schemas.openxmlformats.org/markup-compatibility/2006">
               <mc:Choice xmlns:v="urn:schemas-microsoft-com:vml" Requires="v">
-                <p:oleObj spid="_x0000_s11275" name="Document" r:id="rId4" imgW="7389702" imgH="2352984" progId="Word.Document.12">
+                <p:oleObj spid="_x0000_s11279" name="Document" r:id="rId3" imgW="7389702" imgH="2352984" progId="Word.Document.12">
                   <p:embed/>
                 </p:oleObj>
               </mc:Choice>
               <mc:Fallback>
-                <p:oleObj name="Document" r:id="rId4" imgW="7389702" imgH="2352984" progId="Word.Document.12">
+                <p:oleObj name="Document" r:id="rId3" imgW="7389702" imgH="2352984" progId="Word.Document.12">
                   <p:embed/>
                   <p:pic>
                     <p:nvPicPr>
@@ -7202,7 +7020,7 @@
                       <p:nvPr/>
                     </p:nvPicPr>
                     <p:blipFill>
-                      <a:blip r:embed="rId5"/>
+                      <a:blip r:embed="rId4"/>
                       <a:stretch>
                         <a:fillRect/>
                       </a:stretch>
@@ -7242,7 +7060,7 @@
               <a:defRPr/>
             </a:pPr>
             <a:r>
-              <a:rPr lang="en-US" smtClean="0"/>
+              <a:rPr lang="en-US"/>
               <a:t>Murach's JavaScript and jQuery (3rd Ed.)</a:t>
             </a:r>
             <a:endParaRPr lang="en-US" dirty="0"/>
@@ -7268,39 +7086,38 @@
               <a:defRPr/>
             </a:pPr>
             <a:r>
-              <a:rPr lang="en-US" smtClean="0"/>
+              <a:rPr lang="en-US"/>
               <a:t>© 2017, Mike Murach &amp; Associates, Inc.</a:t>
             </a:r>
+          </a:p>
+        </p:txBody>
+      </p:sp>
+      <p:sp>
+        <p:nvSpPr>
+          <p:cNvPr id="10" name="Slide Number Placeholder 9"/>
+          <p:cNvSpPr>
+            <a:spLocks noGrp="1"/>
+          </p:cNvSpPr>
+          <p:nvPr>
+            <p:ph type="sldNum" sz="quarter" idx="12"/>
+          </p:nvPr>
+        </p:nvSpPr>
+        <p:spPr/>
+        <p:txBody>
+          <a:bodyPr/>
+          <a:lstStyle/>
+          <a:p>
+            <a:pPr>
+              <a:defRPr/>
+            </a:pPr>
             <a:endParaRPr lang="en-US"/>
           </a:p>
-        </p:txBody>
-      </p:sp>
-      <p:sp>
-        <p:nvSpPr>
-          <p:cNvPr id="10" name="Slide Number Placeholder 9"/>
-          <p:cNvSpPr>
-            <a:spLocks noGrp="1"/>
-          </p:cNvSpPr>
-          <p:nvPr>
-            <p:ph type="sldNum" sz="quarter" idx="12"/>
-          </p:nvPr>
-        </p:nvSpPr>
-        <p:spPr/>
-        <p:txBody>
-          <a:bodyPr/>
-          <a:lstStyle/>
-          <a:p>
-            <a:pPr>
-              <a:defRPr/>
-            </a:pPr>
-            <a:endParaRPr lang="en-US" smtClean="0"/>
-          </a:p>
           <a:p>
             <a:pPr algn="r">
               <a:defRPr/>
             </a:pPr>
             <a:r>
-              <a:rPr lang="en-US" sz="900" smtClean="0">
+              <a:rPr lang="en-US" sz="900">
                 <a:solidFill>
                   <a:schemeClr val="bg1"/>
                 </a:solidFill>
@@ -7339,13 +7156,6 @@
   <p:clrMapOvr>
     <a:masterClrMapping/>
   </p:clrMapOvr>
-  <p:timing>
-    <p:tnLst>
-      <p:par>
-        <p:cTn id="1" dur="indefinite" restart="never" nodeType="tmRoot"/>
-      </p:par>
-    </p:tnLst>
-  </p:timing>
 </p:sld>
 </file>
 
@@ -7404,25 +7214,25 @@
           <p:nvPr>
             <p:extLst>
               <p:ext uri="{D42A27DB-BD31-4B8C-83A1-F6EECF244321}">
-                <p14:modId xmlns:p14="http://schemas.microsoft.com/office/powerpoint/2010/main" val="2918071252"/>
+                <p14:modId xmlns:p14="http://schemas.microsoft.com/office/powerpoint/2010/main" val="2093766606"/>
               </p:ext>
             </p:extLst>
           </p:nvPr>
         </p:nvGraphicFramePr>
         <p:xfrm>
-          <a:off x="914400" y="1278140"/>
-          <a:ext cx="7313400" cy="2227060"/>
+          <a:off x="914400" y="1274763"/>
+          <a:ext cx="7253288" cy="2208212"/>
         </p:xfrm>
         <a:graphic>
           <a:graphicData uri="http://schemas.openxmlformats.org/presentationml/2006/ole">
             <mc:AlternateContent xmlns:mc="http://schemas.openxmlformats.org/markup-compatibility/2006">
               <mc:Choice xmlns:v="urn:schemas-microsoft-com:vml" Requires="v">
-                <p:oleObj spid="_x0000_s12299" name="Document" r:id="rId4" imgW="7313400" imgH="2227060" progId="Word.Document.12">
+                <p:oleObj spid="_x0000_s12303" name="Document" r:id="rId3" imgW="7301323" imgH="2231595" progId="Word.Document.12">
                   <p:embed/>
                 </p:oleObj>
               </mc:Choice>
               <mc:Fallback>
-                <p:oleObj name="Document" r:id="rId4" imgW="7313400" imgH="2227060" progId="Word.Document.12">
+                <p:oleObj name="Document" r:id="rId3" imgW="7301323" imgH="2231595" progId="Word.Document.12">
                   <p:embed/>
                   <p:pic>
                     <p:nvPicPr>
@@ -7431,15 +7241,15 @@
                       <p:nvPr/>
                     </p:nvPicPr>
                     <p:blipFill>
-                      <a:blip r:embed="rId5"/>
+                      <a:blip r:embed="rId4"/>
                       <a:stretch>
                         <a:fillRect/>
                       </a:stretch>
                     </p:blipFill>
                     <p:spPr>
                       <a:xfrm>
-                        <a:off x="914400" y="1278140"/>
-                        <a:ext cx="7313400" cy="2227060"/>
+                        <a:off x="914400" y="1274763"/>
+                        <a:ext cx="7253288" cy="2208212"/>
                       </a:xfrm>
                       <a:prstGeom prst="rect">
                         <a:avLst/>
@@ -7471,7 +7281,7 @@
               <a:defRPr/>
             </a:pPr>
             <a:r>
-              <a:rPr lang="en-US" smtClean="0"/>
+              <a:rPr lang="en-US"/>
               <a:t>Murach's JavaScript and jQuery (3rd Ed.)</a:t>
             </a:r>
             <a:endParaRPr lang="en-US" dirty="0"/>
@@ -7497,39 +7307,38 @@
               <a:defRPr/>
             </a:pPr>
             <a:r>
-              <a:rPr lang="en-US" smtClean="0"/>
+              <a:rPr lang="en-US"/>
               <a:t>© 2017, Mike Murach &amp; Associates, Inc.</a:t>
             </a:r>
+          </a:p>
+        </p:txBody>
+      </p:sp>
+      <p:sp>
+        <p:nvSpPr>
+          <p:cNvPr id="10" name="Slide Number Placeholder 9"/>
+          <p:cNvSpPr>
+            <a:spLocks noGrp="1"/>
+          </p:cNvSpPr>
+          <p:nvPr>
+            <p:ph type="sldNum" sz="quarter" idx="12"/>
+          </p:nvPr>
+        </p:nvSpPr>
+        <p:spPr/>
+        <p:txBody>
+          <a:bodyPr/>
+          <a:lstStyle/>
+          <a:p>
+            <a:pPr>
+              <a:defRPr/>
+            </a:pPr>
             <a:endParaRPr lang="en-US"/>
           </a:p>
-        </p:txBody>
-      </p:sp>
-      <p:sp>
-        <p:nvSpPr>
-          <p:cNvPr id="10" name="Slide Number Placeholder 9"/>
-          <p:cNvSpPr>
-            <a:spLocks noGrp="1"/>
-          </p:cNvSpPr>
-          <p:nvPr>
-            <p:ph type="sldNum" sz="quarter" idx="12"/>
-          </p:nvPr>
-        </p:nvSpPr>
-        <p:spPr/>
-        <p:txBody>
-          <a:bodyPr/>
-          <a:lstStyle/>
-          <a:p>
-            <a:pPr>
-              <a:defRPr/>
-            </a:pPr>
-            <a:endParaRPr lang="en-US" smtClean="0"/>
-          </a:p>
           <a:p>
             <a:pPr algn="r">
               <a:defRPr/>
             </a:pPr>
             <a:r>
-              <a:rPr lang="en-US" sz="900" smtClean="0">
+              <a:rPr lang="en-US" sz="900">
                 <a:solidFill>
                   <a:schemeClr val="bg1"/>
                 </a:solidFill>
@@ -7568,13 +7377,6 @@
   <p:clrMapOvr>
     <a:masterClrMapping/>
   </p:clrMapOvr>
-  <p:timing>
-    <p:tnLst>
-      <p:par>
-        <p:cTn id="1" dur="indefinite" restart="never" nodeType="tmRoot"/>
-      </p:par>
-    </p:tnLst>
-  </p:timing>
 </p:sld>
 </file>
 
@@ -7633,25 +7435,25 @@
           <p:nvPr>
             <p:extLst>
               <p:ext uri="{D42A27DB-BD31-4B8C-83A1-F6EECF244321}">
-                <p14:modId xmlns:p14="http://schemas.microsoft.com/office/powerpoint/2010/main" val="3380827818"/>
+                <p14:modId xmlns:p14="http://schemas.microsoft.com/office/powerpoint/2010/main" val="3282629772"/>
               </p:ext>
             </p:extLst>
           </p:nvPr>
         </p:nvGraphicFramePr>
         <p:xfrm>
-          <a:off x="914400" y="1295400"/>
-          <a:ext cx="7313400" cy="3457520"/>
+          <a:off x="923925" y="1293813"/>
+          <a:ext cx="7254875" cy="3422650"/>
         </p:xfrm>
         <a:graphic>
           <a:graphicData uri="http://schemas.openxmlformats.org/presentationml/2006/ole">
             <mc:AlternateContent xmlns:mc="http://schemas.openxmlformats.org/markup-compatibility/2006">
               <mc:Choice xmlns:v="urn:schemas-microsoft-com:vml" Requires="v">
-                <p:oleObj spid="_x0000_s13323" name="Document" r:id="rId4" imgW="7313400" imgH="3457520" progId="Word.Document.12">
+                <p:oleObj spid="_x0000_s13327" name="Document" r:id="rId3" imgW="7301323" imgH="3467444" progId="Word.Document.12">
                   <p:embed/>
                 </p:oleObj>
               </mc:Choice>
               <mc:Fallback>
-                <p:oleObj name="Document" r:id="rId4" imgW="7313400" imgH="3457520" progId="Word.Document.12">
+                <p:oleObj name="Document" r:id="rId3" imgW="7301323" imgH="3467444" progId="Word.Document.12">
                   <p:embed/>
                   <p:pic>
                     <p:nvPicPr>
@@ -7660,15 +7462,15 @@
                       <p:nvPr/>
                     </p:nvPicPr>
                     <p:blipFill>
-                      <a:blip r:embed="rId5"/>
+                      <a:blip r:embed="rId4"/>
                       <a:stretch>
                         <a:fillRect/>
                       </a:stretch>
                     </p:blipFill>
                     <p:spPr>
                       <a:xfrm>
-                        <a:off x="914400" y="1295400"/>
-                        <a:ext cx="7313400" cy="3457520"/>
+                        <a:off x="923925" y="1293813"/>
+                        <a:ext cx="7254875" cy="3422650"/>
                       </a:xfrm>
                       <a:prstGeom prst="rect">
                         <a:avLst/>
@@ -7700,7 +7502,7 @@
               <a:defRPr/>
             </a:pPr>
             <a:r>
-              <a:rPr lang="en-US" smtClean="0"/>
+              <a:rPr lang="en-US"/>
               <a:t>Murach's JavaScript and jQuery (3rd Ed.)</a:t>
             </a:r>
             <a:endParaRPr lang="en-US" dirty="0"/>
@@ -7726,39 +7528,38 @@
               <a:defRPr/>
             </a:pPr>
             <a:r>
-              <a:rPr lang="en-US" smtClean="0"/>
+              <a:rPr lang="en-US"/>
               <a:t>© 2017, Mike Murach &amp; Associates, Inc.</a:t>
             </a:r>
+          </a:p>
+        </p:txBody>
+      </p:sp>
+      <p:sp>
+        <p:nvSpPr>
+          <p:cNvPr id="9" name="Slide Number Placeholder 8"/>
+          <p:cNvSpPr>
+            <a:spLocks noGrp="1"/>
+          </p:cNvSpPr>
+          <p:nvPr>
+            <p:ph type="sldNum" sz="quarter" idx="12"/>
+          </p:nvPr>
+        </p:nvSpPr>
+        <p:spPr/>
+        <p:txBody>
+          <a:bodyPr/>
+          <a:lstStyle/>
+          <a:p>
+            <a:pPr>
+              <a:defRPr/>
+            </a:pPr>
             <a:endParaRPr lang="en-US"/>
           </a:p>
-        </p:txBody>
-      </p:sp>
-      <p:sp>
-        <p:nvSpPr>
-          <p:cNvPr id="9" name="Slide Number Placeholder 8"/>
-          <p:cNvSpPr>
-            <a:spLocks noGrp="1"/>
-          </p:cNvSpPr>
-          <p:nvPr>
-            <p:ph type="sldNum" sz="quarter" idx="12"/>
-          </p:nvPr>
-        </p:nvSpPr>
-        <p:spPr/>
-        <p:txBody>
-          <a:bodyPr/>
-          <a:lstStyle/>
-          <a:p>
-            <a:pPr>
-              <a:defRPr/>
-            </a:pPr>
-            <a:endParaRPr lang="en-US" smtClean="0"/>
-          </a:p>
           <a:p>
             <a:pPr algn="r">
               <a:defRPr/>
             </a:pPr>
             <a:r>
-              <a:rPr lang="en-US" sz="900" smtClean="0">
+              <a:rPr lang="en-US" sz="900">
                 <a:solidFill>
                   <a:schemeClr val="bg1"/>
                 </a:solidFill>
@@ -7797,13 +7598,6 @@
   <p:clrMapOvr>
     <a:masterClrMapping/>
   </p:clrMapOvr>
-  <p:timing>
-    <p:tnLst>
-      <p:par>
-        <p:cTn id="1" dur="indefinite" restart="never" nodeType="tmRoot"/>
-      </p:par>
-    </p:tnLst>
-  </p:timing>
 </p:sld>
 </file>
 
@@ -7841,15 +7635,7 @@
           <a:p>
             <a:r>
               <a:rPr lang="en-US" dirty="0"/>
-              <a:t>How to preload an image </a:t>
-            </a:r>
-            <a:r>
-              <a:rPr lang="en-US" dirty="0" smtClean="0"/>
-              <a:t>with </a:t>
-            </a:r>
-            <a:r>
-              <a:rPr lang="en-US" dirty="0"/>
-              <a:t>the Image object</a:t>
+              <a:t>How to preload an image with the Image object</a:t>
             </a:r>
           </a:p>
         </p:txBody>
@@ -7876,12 +7662,12 @@
           <a:graphicData uri="http://schemas.openxmlformats.org/presentationml/2006/ole">
             <mc:AlternateContent xmlns:mc="http://schemas.openxmlformats.org/markup-compatibility/2006">
               <mc:Choice xmlns:v="urn:schemas-microsoft-com:vml" Requires="v">
-                <p:oleObj spid="_x0000_s20491" name="Document" r:id="rId4" imgW="7313400" imgH="1424743" progId="Word.Document.12">
+                <p:oleObj spid="_x0000_s20495" name="Document" r:id="rId3" imgW="7313400" imgH="1424743" progId="Word.Document.12">
                   <p:embed/>
                 </p:oleObj>
               </mc:Choice>
               <mc:Fallback>
-                <p:oleObj name="Document" r:id="rId4" imgW="7313400" imgH="1424743" progId="Word.Document.12">
+                <p:oleObj name="Document" r:id="rId3" imgW="7313400" imgH="1424743" progId="Word.Document.12">
                   <p:embed/>
                   <p:pic>
                     <p:nvPicPr>
@@ -7890,7 +7676,7 @@
                       <p:nvPr/>
                     </p:nvPicPr>
                     <p:blipFill>
-                      <a:blip r:embed="rId5"/>
+                      <a:blip r:embed="rId4"/>
                       <a:stretch>
                         <a:fillRect/>
                       </a:stretch>
@@ -7930,7 +7716,7 @@
               <a:defRPr/>
             </a:pPr>
             <a:r>
-              <a:rPr lang="en-US" smtClean="0"/>
+              <a:rPr lang="en-US"/>
               <a:t>Murach's JavaScript and jQuery (3rd Ed.)</a:t>
             </a:r>
             <a:endParaRPr lang="en-US" dirty="0"/>
@@ -7956,39 +7742,38 @@
               <a:defRPr/>
             </a:pPr>
             <a:r>
-              <a:rPr lang="en-US" smtClean="0"/>
+              <a:rPr lang="en-US"/>
               <a:t>© 2017, Mike Murach &amp; Associates, Inc.</a:t>
             </a:r>
+          </a:p>
+        </p:txBody>
+      </p:sp>
+      <p:sp>
+        <p:nvSpPr>
+          <p:cNvPr id="10" name="Slide Number Placeholder 9"/>
+          <p:cNvSpPr>
+            <a:spLocks noGrp="1"/>
+          </p:cNvSpPr>
+          <p:nvPr>
+            <p:ph type="sldNum" sz="quarter" idx="12"/>
+          </p:nvPr>
+        </p:nvSpPr>
+        <p:spPr/>
+        <p:txBody>
+          <a:bodyPr/>
+          <a:lstStyle/>
+          <a:p>
+            <a:pPr>
+              <a:defRPr/>
+            </a:pPr>
             <a:endParaRPr lang="en-US"/>
           </a:p>
-        </p:txBody>
-      </p:sp>
-      <p:sp>
-        <p:nvSpPr>
-          <p:cNvPr id="10" name="Slide Number Placeholder 9"/>
-          <p:cNvSpPr>
-            <a:spLocks noGrp="1"/>
-          </p:cNvSpPr>
-          <p:nvPr>
-            <p:ph type="sldNum" sz="quarter" idx="12"/>
-          </p:nvPr>
-        </p:nvSpPr>
-        <p:spPr/>
-        <p:txBody>
-          <a:bodyPr/>
-          <a:lstStyle/>
-          <a:p>
-            <a:pPr>
-              <a:defRPr/>
-            </a:pPr>
-            <a:endParaRPr lang="en-US" smtClean="0"/>
-          </a:p>
           <a:p>
             <a:pPr algn="r">
               <a:defRPr/>
             </a:pPr>
             <a:r>
-              <a:rPr lang="en-US" sz="900" smtClean="0">
+              <a:rPr lang="en-US" sz="900">
                 <a:solidFill>
                   <a:schemeClr val="bg1"/>
                 </a:solidFill>
@@ -8027,13 +7812,6 @@
   <p:clrMapOvr>
     <a:masterClrMapping/>
   </p:clrMapOvr>
-  <p:timing>
-    <p:tnLst>
-      <p:par>
-        <p:cTn id="1" dur="indefinite" restart="never" nodeType="tmRoot"/>
-      </p:par>
-    </p:tnLst>
-  </p:timing>
 </p:sld>
 </file>
 
@@ -8105,25 +7883,25 @@
           <p:nvPr>
             <p:extLst>
               <p:ext uri="{D42A27DB-BD31-4B8C-83A1-F6EECF244321}">
-                <p14:modId xmlns:p14="http://schemas.microsoft.com/office/powerpoint/2010/main" val="1298385509"/>
+                <p14:modId xmlns:p14="http://schemas.microsoft.com/office/powerpoint/2010/main" val="2470844616"/>
               </p:ext>
             </p:extLst>
           </p:nvPr>
         </p:nvGraphicFramePr>
         <p:xfrm>
-          <a:off x="914400" y="1295400"/>
-          <a:ext cx="7313400" cy="1610391"/>
+          <a:off x="914400" y="1293813"/>
+          <a:ext cx="7170738" cy="1573212"/>
         </p:xfrm>
         <a:graphic>
           <a:graphicData uri="http://schemas.openxmlformats.org/presentationml/2006/ole">
             <mc:AlternateContent xmlns:mc="http://schemas.openxmlformats.org/markup-compatibility/2006">
               <mc:Choice xmlns:v="urn:schemas-microsoft-com:vml" Requires="v">
-                <p:oleObj spid="_x0000_s21515" name="Document" r:id="rId4" imgW="7313400" imgH="1610391" progId="Word.Document.12">
+                <p:oleObj spid="_x0000_s21519" name="Document" r:id="rId3" imgW="7301323" imgH="1613670" progId="Word.Document.12">
                   <p:embed/>
                 </p:oleObj>
               </mc:Choice>
               <mc:Fallback>
-                <p:oleObj name="Document" r:id="rId4" imgW="7313400" imgH="1610391" progId="Word.Document.12">
+                <p:oleObj name="Document" r:id="rId3" imgW="7301323" imgH="1613670" progId="Word.Document.12">
                   <p:embed/>
                   <p:pic>
                     <p:nvPicPr>
@@ -8132,15 +7910,15 @@
                       <p:nvPr/>
                     </p:nvPicPr>
                     <p:blipFill>
-                      <a:blip r:embed="rId5"/>
+                      <a:blip r:embed="rId4"/>
                       <a:stretch>
                         <a:fillRect/>
                       </a:stretch>
                     </p:blipFill>
                     <p:spPr>
                       <a:xfrm>
-                        <a:off x="914400" y="1295400"/>
-                        <a:ext cx="7313400" cy="1610391"/>
+                        <a:off x="914400" y="1293813"/>
+                        <a:ext cx="7170738" cy="1573212"/>
                       </a:xfrm>
                       <a:prstGeom prst="rect">
                         <a:avLst/>
@@ -8172,7 +7950,7 @@
               <a:defRPr/>
             </a:pPr>
             <a:r>
-              <a:rPr lang="en-US" smtClean="0"/>
+              <a:rPr lang="en-US"/>
               <a:t>Murach's JavaScript and jQuery (3rd Ed.)</a:t>
             </a:r>
             <a:endParaRPr lang="en-US" dirty="0"/>
@@ -8198,39 +7976,38 @@
               <a:defRPr/>
             </a:pPr>
             <a:r>
-              <a:rPr lang="en-US" smtClean="0"/>
+              <a:rPr lang="en-US"/>
               <a:t>© 2017, Mike Murach &amp; Associates, Inc.</a:t>
             </a:r>
+          </a:p>
+        </p:txBody>
+      </p:sp>
+      <p:sp>
+        <p:nvSpPr>
+          <p:cNvPr id="10" name="Slide Number Placeholder 9"/>
+          <p:cNvSpPr>
+            <a:spLocks noGrp="1"/>
+          </p:cNvSpPr>
+          <p:nvPr>
+            <p:ph type="sldNum" sz="quarter" idx="12"/>
+          </p:nvPr>
+        </p:nvSpPr>
+        <p:spPr/>
+        <p:txBody>
+          <a:bodyPr/>
+          <a:lstStyle/>
+          <a:p>
+            <a:pPr>
+              <a:defRPr/>
+            </a:pPr>
             <a:endParaRPr lang="en-US"/>
           </a:p>
-        </p:txBody>
-      </p:sp>
-      <p:sp>
-        <p:nvSpPr>
-          <p:cNvPr id="10" name="Slide Number Placeholder 9"/>
-          <p:cNvSpPr>
-            <a:spLocks noGrp="1"/>
-          </p:cNvSpPr>
-          <p:nvPr>
-            <p:ph type="sldNum" sz="quarter" idx="12"/>
-          </p:nvPr>
-        </p:nvSpPr>
-        <p:spPr/>
-        <p:txBody>
-          <a:bodyPr/>
-          <a:lstStyle/>
-          <a:p>
-            <a:pPr>
-              <a:defRPr/>
-            </a:pPr>
-            <a:endParaRPr lang="en-US" smtClean="0"/>
-          </a:p>
           <a:p>
             <a:pPr algn="r">
               <a:defRPr/>
             </a:pPr>
             <a:r>
-              <a:rPr lang="en-US" sz="900" smtClean="0">
+              <a:rPr lang="en-US" sz="900">
                 <a:solidFill>
                   <a:schemeClr val="bg1"/>
                 </a:solidFill>
@@ -8269,13 +8046,6 @@
   <p:clrMapOvr>
     <a:masterClrMapping/>
   </p:clrMapOvr>
-  <p:timing>
-    <p:tnLst>
-      <p:par>
-        <p:cTn id="1" dur="indefinite" restart="never" nodeType="tmRoot"/>
-      </p:par>
-    </p:tnLst>
-  </p:timing>
 </p:sld>
 </file>
 
@@ -8377,7 +8147,7 @@
               <a:defRPr/>
             </a:pPr>
             <a:r>
-              <a:rPr lang="en-US" smtClean="0"/>
+              <a:rPr lang="en-US"/>
               <a:t>Murach's JavaScript and jQuery (3rd Ed.)</a:t>
             </a:r>
             <a:endParaRPr lang="en-US" dirty="0"/>
@@ -8403,39 +8173,38 @@
               <a:defRPr/>
             </a:pPr>
             <a:r>
-              <a:rPr lang="en-US" smtClean="0"/>
+              <a:rPr lang="en-US"/>
               <a:t>© 2017, Mike Murach &amp; Associates, Inc.</a:t>
             </a:r>
+          </a:p>
+        </p:txBody>
+      </p:sp>
+      <p:sp>
+        <p:nvSpPr>
+          <p:cNvPr id="10" name="Slide Number Placeholder 9"/>
+          <p:cNvSpPr>
+            <a:spLocks noGrp="1"/>
+          </p:cNvSpPr>
+          <p:nvPr>
+            <p:ph type="sldNum" sz="quarter" idx="12"/>
+          </p:nvPr>
+        </p:nvSpPr>
+        <p:spPr/>
+        <p:txBody>
+          <a:bodyPr/>
+          <a:lstStyle/>
+          <a:p>
+            <a:pPr>
+              <a:defRPr/>
+            </a:pPr>
             <a:endParaRPr lang="en-US"/>
           </a:p>
-        </p:txBody>
-      </p:sp>
-      <p:sp>
-        <p:nvSpPr>
-          <p:cNvPr id="10" name="Slide Number Placeholder 9"/>
-          <p:cNvSpPr>
-            <a:spLocks noGrp="1"/>
-          </p:cNvSpPr>
-          <p:nvPr>
-            <p:ph type="sldNum" sz="quarter" idx="12"/>
-          </p:nvPr>
-        </p:nvSpPr>
-        <p:spPr/>
-        <p:txBody>
-          <a:bodyPr/>
-          <a:lstStyle/>
-          <a:p>
-            <a:pPr>
-              <a:defRPr/>
-            </a:pPr>
-            <a:endParaRPr lang="en-US" smtClean="0"/>
-          </a:p>
           <a:p>
             <a:pPr algn="r">
               <a:defRPr/>
             </a:pPr>
             <a:r>
-              <a:rPr lang="en-US" sz="900" smtClean="0">
+              <a:rPr lang="en-US" sz="900">
                 <a:solidFill>
                   <a:schemeClr val="bg1"/>
                 </a:solidFill>
@@ -8474,13 +8243,6 @@
   <p:clrMapOvr>
     <a:masterClrMapping/>
   </p:clrMapOvr>
-  <p:timing>
-    <p:tnLst>
-      <p:par>
-        <p:cTn id="1" dur="indefinite" restart="never" nodeType="tmRoot"/>
-      </p:par>
-    </p:tnLst>
-  </p:timing>
 </p:sld>
 </file>
 
@@ -8550,12 +8312,12 @@
           <a:graphicData uri="http://schemas.openxmlformats.org/presentationml/2006/ole">
             <mc:AlternateContent xmlns:mc="http://schemas.openxmlformats.org/markup-compatibility/2006">
               <mc:Choice xmlns:v="urn:schemas-microsoft-com:vml" Requires="v">
-                <p:oleObj spid="_x0000_s22539" name="Document" r:id="rId4" imgW="7313400" imgH="4272429" progId="Word.Document.12">
+                <p:oleObj spid="_x0000_s22543" name="Document" r:id="rId3" imgW="7313400" imgH="4272429" progId="Word.Document.12">
                   <p:embed/>
                 </p:oleObj>
               </mc:Choice>
               <mc:Fallback>
-                <p:oleObj name="Document" r:id="rId4" imgW="7313400" imgH="4272429" progId="Word.Document.12">
+                <p:oleObj name="Document" r:id="rId3" imgW="7313400" imgH="4272429" progId="Word.Document.12">
                   <p:embed/>
                   <p:pic>
                     <p:nvPicPr>
@@ -8564,7 +8326,7 @@
                       <p:nvPr/>
                     </p:nvPicPr>
                     <p:blipFill>
-                      <a:blip r:embed="rId5"/>
+                      <a:blip r:embed="rId4"/>
                       <a:stretch>
                         <a:fillRect/>
                       </a:stretch>
@@ -8604,7 +8366,7 @@
               <a:defRPr/>
             </a:pPr>
             <a:r>
-              <a:rPr lang="en-US" smtClean="0"/>
+              <a:rPr lang="en-US"/>
               <a:t>Murach's JavaScript and jQuery (3rd Ed.)</a:t>
             </a:r>
             <a:endParaRPr lang="en-US" dirty="0"/>
@@ -8630,39 +8392,38 @@
               <a:defRPr/>
             </a:pPr>
             <a:r>
-              <a:rPr lang="en-US" smtClean="0"/>
+              <a:rPr lang="en-US"/>
               <a:t>© 2017, Mike Murach &amp; Associates, Inc.</a:t>
             </a:r>
+          </a:p>
+        </p:txBody>
+      </p:sp>
+      <p:sp>
+        <p:nvSpPr>
+          <p:cNvPr id="10" name="Slide Number Placeholder 9"/>
+          <p:cNvSpPr>
+            <a:spLocks noGrp="1"/>
+          </p:cNvSpPr>
+          <p:nvPr>
+            <p:ph type="sldNum" sz="quarter" idx="12"/>
+          </p:nvPr>
+        </p:nvSpPr>
+        <p:spPr/>
+        <p:txBody>
+          <a:bodyPr/>
+          <a:lstStyle/>
+          <a:p>
+            <a:pPr>
+              <a:defRPr/>
+            </a:pPr>
             <a:endParaRPr lang="en-US"/>
           </a:p>
-        </p:txBody>
-      </p:sp>
-      <p:sp>
-        <p:nvSpPr>
-          <p:cNvPr id="10" name="Slide Number Placeholder 9"/>
-          <p:cNvSpPr>
-            <a:spLocks noGrp="1"/>
-          </p:cNvSpPr>
-          <p:nvPr>
-            <p:ph type="sldNum" sz="quarter" idx="12"/>
-          </p:nvPr>
-        </p:nvSpPr>
-        <p:spPr/>
-        <p:txBody>
-          <a:bodyPr/>
-          <a:lstStyle/>
-          <a:p>
-            <a:pPr>
-              <a:defRPr/>
-            </a:pPr>
-            <a:endParaRPr lang="en-US" smtClean="0"/>
-          </a:p>
           <a:p>
             <a:pPr algn="r">
               <a:defRPr/>
             </a:pPr>
             <a:r>
-              <a:rPr lang="en-US" sz="900" smtClean="0">
+              <a:rPr lang="en-US" sz="900">
                 <a:solidFill>
                   <a:schemeClr val="bg1"/>
                 </a:solidFill>
@@ -8701,13 +8462,6 @@
   <p:clrMapOvr>
     <a:masterClrMapping/>
   </p:clrMapOvr>
-  <p:timing>
-    <p:tnLst>
-      <p:par>
-        <p:cTn id="1" dur="indefinite" restart="never" nodeType="tmRoot"/>
-      </p:par>
-    </p:tnLst>
-  </p:timing>
 </p:sld>
 </file>
 

</xml_diff>